<commit_message>
Basic implementation of first view
</commit_message>
<xml_diff>
--- a/main_objects/ship_icons.pptx
+++ b/main_objects/ship_icons.pptx
@@ -2,14 +2,16 @@
 <file path=ppt/presentation.xml><?xml version="1.0" encoding="utf-8"?>
 <p:presentation xmlns:a="http://schemas.openxmlformats.org/drawingml/2006/main" xmlns:r="http://schemas.openxmlformats.org/officeDocument/2006/relationships" xmlns:p="http://schemas.openxmlformats.org/presentationml/2006/main" saveSubsetFonts="1">
   <p:sldMasterIdLst>
-    <p:sldMasterId id="2147483660" r:id="rId1"/>
+    <p:sldMasterId id="2147483672" r:id="rId1"/>
   </p:sldMasterIdLst>
   <p:sldIdLst>
     <p:sldId id="256" r:id="rId2"/>
     <p:sldId id="257" r:id="rId3"/>
-    <p:sldId id="258" r:id="rId4"/>
+    <p:sldId id="259" r:id="rId4"/>
+    <p:sldId id="258" r:id="rId5"/>
+    <p:sldId id="260" r:id="rId6"/>
   </p:sldIdLst>
-  <p:sldSz cx="1828800" cy="1828800"/>
+  <p:sldSz cx="10058400" cy="10058400"/>
   <p:notesSz cx="6858000" cy="9144000"/>
   <p:defaultTextStyle>
     <a:defPPr>
@@ -117,7 +119,7 @@
 <file path=ppt/revisionInfo.xml><?xml version="1.0" encoding="utf-8"?>
 <p1510:revInfo xmlns:a="http://schemas.openxmlformats.org/drawingml/2006/main" xmlns:r="http://schemas.openxmlformats.org/officeDocument/2006/relationships" xmlns:p1510="http://schemas.microsoft.com/office/powerpoint/2015/10/main">
   <p1510:revLst>
-    <p1510:client id="{E5BA1A89-EBF5-4CB7-B66D-D9C98733EBEC}" v="3" dt="2021-11-13T19:36:14.696"/>
+    <p1510:client id="{E5BA1A89-EBF5-4CB7-B66D-D9C98733EBEC}" v="6" dt="2021-11-19T04:31:00.865"/>
   </p1510:revLst>
 </p1510:revInfo>
 </file>
@@ -214,11 +216,41 @@
   </pc:docChgLst>
   <pc:docChgLst>
     <pc:chgData name="Bin Ahmad Shahrir, Ahmad Faris Durrani" userId="954f8fee-853d-473d-b74c-b345ae6d86a0" providerId="ADAL" clId="{E5BA1A89-EBF5-4CB7-B66D-D9C98733EBEC}"/>
-    <pc:docChg chg="addSld delSld modSld sldOrd">
-      <pc:chgData name="Bin Ahmad Shahrir, Ahmad Faris Durrani" userId="954f8fee-853d-473d-b74c-b345ae6d86a0" providerId="ADAL" clId="{E5BA1A89-EBF5-4CB7-B66D-D9C98733EBEC}" dt="2021-11-13T19:37:29.913" v="8" actId="208"/>
+    <pc:docChg chg="undo custSel addSld delSld modSld sldOrd modMainMaster">
+      <pc:chgData name="Bin Ahmad Shahrir, Ahmad Faris Durrani" userId="954f8fee-853d-473d-b74c-b345ae6d86a0" providerId="ADAL" clId="{E5BA1A89-EBF5-4CB7-B66D-D9C98733EBEC}" dt="2021-11-19T04:59:08.128" v="35" actId="207"/>
       <pc:docMkLst>
         <pc:docMk/>
       </pc:docMkLst>
+      <pc:sldChg chg="modSp mod">
+        <pc:chgData name="Bin Ahmad Shahrir, Ahmad Faris Durrani" userId="954f8fee-853d-473d-b74c-b345ae6d86a0" providerId="ADAL" clId="{E5BA1A89-EBF5-4CB7-B66D-D9C98733EBEC}" dt="2021-11-19T04:30:44.743" v="11"/>
+        <pc:sldMkLst>
+          <pc:docMk/>
+          <pc:sldMk cId="1890723997" sldId="256"/>
+        </pc:sldMkLst>
+        <pc:spChg chg="mod">
+          <ac:chgData name="Bin Ahmad Shahrir, Ahmad Faris Durrani" userId="954f8fee-853d-473d-b74c-b345ae6d86a0" providerId="ADAL" clId="{E5BA1A89-EBF5-4CB7-B66D-D9C98733EBEC}" dt="2021-11-19T04:30:44.743" v="11"/>
+          <ac:spMkLst>
+            <pc:docMk/>
+            <pc:sldMk cId="1890723997" sldId="256"/>
+            <ac:spMk id="13" creationId="{CFDD104E-47D7-4EDD-ACE7-AF9FDCFD3301}"/>
+          </ac:spMkLst>
+        </pc:spChg>
+      </pc:sldChg>
+      <pc:sldChg chg="modSp">
+        <pc:chgData name="Bin Ahmad Shahrir, Ahmad Faris Durrani" userId="954f8fee-853d-473d-b74c-b345ae6d86a0" providerId="ADAL" clId="{E5BA1A89-EBF5-4CB7-B66D-D9C98733EBEC}" dt="2021-11-19T04:30:44.743" v="11"/>
+        <pc:sldMkLst>
+          <pc:docMk/>
+          <pc:sldMk cId="2286402905" sldId="257"/>
+        </pc:sldMkLst>
+        <pc:spChg chg="mod">
+          <ac:chgData name="Bin Ahmad Shahrir, Ahmad Faris Durrani" userId="954f8fee-853d-473d-b74c-b345ae6d86a0" providerId="ADAL" clId="{E5BA1A89-EBF5-4CB7-B66D-D9C98733EBEC}" dt="2021-11-19T04:30:44.743" v="11"/>
+          <ac:spMkLst>
+            <pc:docMk/>
+            <pc:sldMk cId="2286402905" sldId="257"/>
+            <ac:spMk id="13" creationId="{CFDD104E-47D7-4EDD-ACE7-AF9FDCFD3301}"/>
+          </ac:spMkLst>
+        </pc:spChg>
+      </pc:sldChg>
       <pc:sldChg chg="add del setBg">
         <pc:chgData name="Bin Ahmad Shahrir, Ahmad Faris Durrani" userId="954f8fee-853d-473d-b74c-b345ae6d86a0" providerId="ADAL" clId="{E5BA1A89-EBF5-4CB7-B66D-D9C98733EBEC}" dt="2021-11-13T19:36:11.928" v="1"/>
         <pc:sldMkLst>
@@ -234,13 +266,13 @@
         </pc:sldMkLst>
       </pc:sldChg>
       <pc:sldChg chg="modSp add mod ord">
-        <pc:chgData name="Bin Ahmad Shahrir, Ahmad Faris Durrani" userId="954f8fee-853d-473d-b74c-b345ae6d86a0" providerId="ADAL" clId="{E5BA1A89-EBF5-4CB7-B66D-D9C98733EBEC}" dt="2021-11-13T19:37:29.913" v="8" actId="208"/>
+        <pc:chgData name="Bin Ahmad Shahrir, Ahmad Faris Durrani" userId="954f8fee-853d-473d-b74c-b345ae6d86a0" providerId="ADAL" clId="{E5BA1A89-EBF5-4CB7-B66D-D9C98733EBEC}" dt="2021-11-19T04:30:44.743" v="11"/>
         <pc:sldMkLst>
           <pc:docMk/>
           <pc:sldMk cId="3770827803" sldId="258"/>
         </pc:sldMkLst>
         <pc:spChg chg="mod">
-          <ac:chgData name="Bin Ahmad Shahrir, Ahmad Faris Durrani" userId="954f8fee-853d-473d-b74c-b345ae6d86a0" providerId="ADAL" clId="{E5BA1A89-EBF5-4CB7-B66D-D9C98733EBEC}" dt="2021-11-13T19:37:29.913" v="8" actId="208"/>
+          <ac:chgData name="Bin Ahmad Shahrir, Ahmad Faris Durrani" userId="954f8fee-853d-473d-b74c-b345ae6d86a0" providerId="ADAL" clId="{E5BA1A89-EBF5-4CB7-B66D-D9C98733EBEC}" dt="2021-11-19T04:30:44.743" v="11"/>
           <ac:spMkLst>
             <pc:docMk/>
             <pc:sldMk cId="3770827803" sldId="258"/>
@@ -248,6 +280,310 @@
           </ac:spMkLst>
         </pc:spChg>
       </pc:sldChg>
+      <pc:sldChg chg="modSp add mod">
+        <pc:chgData name="Bin Ahmad Shahrir, Ahmad Faris Durrani" userId="954f8fee-853d-473d-b74c-b345ae6d86a0" providerId="ADAL" clId="{E5BA1A89-EBF5-4CB7-B66D-D9C98733EBEC}" dt="2021-11-19T04:58:48.390" v="31" actId="12789"/>
+        <pc:sldMkLst>
+          <pc:docMk/>
+          <pc:sldMk cId="2020050380" sldId="259"/>
+        </pc:sldMkLst>
+        <pc:spChg chg="mod">
+          <ac:chgData name="Bin Ahmad Shahrir, Ahmad Faris Durrani" userId="954f8fee-853d-473d-b74c-b345ae6d86a0" providerId="ADAL" clId="{E5BA1A89-EBF5-4CB7-B66D-D9C98733EBEC}" dt="2021-11-19T04:58:48.390" v="31" actId="12789"/>
+          <ac:spMkLst>
+            <pc:docMk/>
+            <pc:sldMk cId="2020050380" sldId="259"/>
+            <ac:spMk id="13" creationId="{CFDD104E-47D7-4EDD-ACE7-AF9FDCFD3301}"/>
+          </ac:spMkLst>
+        </pc:spChg>
+      </pc:sldChg>
+      <pc:sldChg chg="modSp add mod ord">
+        <pc:chgData name="Bin Ahmad Shahrir, Ahmad Faris Durrani" userId="954f8fee-853d-473d-b74c-b345ae6d86a0" providerId="ADAL" clId="{E5BA1A89-EBF5-4CB7-B66D-D9C98733EBEC}" dt="2021-11-19T04:59:08.128" v="35" actId="207"/>
+        <pc:sldMkLst>
+          <pc:docMk/>
+          <pc:sldMk cId="1703431415" sldId="260"/>
+        </pc:sldMkLst>
+        <pc:spChg chg="mod">
+          <ac:chgData name="Bin Ahmad Shahrir, Ahmad Faris Durrani" userId="954f8fee-853d-473d-b74c-b345ae6d86a0" providerId="ADAL" clId="{E5BA1A89-EBF5-4CB7-B66D-D9C98733EBEC}" dt="2021-11-19T04:59:08.128" v="35" actId="207"/>
+          <ac:spMkLst>
+            <pc:docMk/>
+            <pc:sldMk cId="1703431415" sldId="260"/>
+            <ac:spMk id="13" creationId="{CFDD104E-47D7-4EDD-ACE7-AF9FDCFD3301}"/>
+          </ac:spMkLst>
+        </pc:spChg>
+      </pc:sldChg>
+      <pc:sldMasterChg chg="modSp modSldLayout">
+        <pc:chgData name="Bin Ahmad Shahrir, Ahmad Faris Durrani" userId="954f8fee-853d-473d-b74c-b345ae6d86a0" providerId="ADAL" clId="{E5BA1A89-EBF5-4CB7-B66D-D9C98733EBEC}" dt="2021-11-19T04:30:44.743" v="11"/>
+        <pc:sldMasterMkLst>
+          <pc:docMk/>
+          <pc:sldMasterMk cId="1221472670" sldId="2147483660"/>
+        </pc:sldMasterMkLst>
+        <pc:spChg chg="mod">
+          <ac:chgData name="Bin Ahmad Shahrir, Ahmad Faris Durrani" userId="954f8fee-853d-473d-b74c-b345ae6d86a0" providerId="ADAL" clId="{E5BA1A89-EBF5-4CB7-B66D-D9C98733EBEC}" dt="2021-11-19T04:30:44.743" v="11"/>
+          <ac:spMkLst>
+            <pc:docMk/>
+            <pc:sldMasterMk cId="1221472670" sldId="2147483660"/>
+            <ac:spMk id="2" creationId="{00000000-0000-0000-0000-000000000000}"/>
+          </ac:spMkLst>
+        </pc:spChg>
+        <pc:spChg chg="mod">
+          <ac:chgData name="Bin Ahmad Shahrir, Ahmad Faris Durrani" userId="954f8fee-853d-473d-b74c-b345ae6d86a0" providerId="ADAL" clId="{E5BA1A89-EBF5-4CB7-B66D-D9C98733EBEC}" dt="2021-11-19T04:30:44.743" v="11"/>
+          <ac:spMkLst>
+            <pc:docMk/>
+            <pc:sldMasterMk cId="1221472670" sldId="2147483660"/>
+            <ac:spMk id="3" creationId="{00000000-0000-0000-0000-000000000000}"/>
+          </ac:spMkLst>
+        </pc:spChg>
+        <pc:spChg chg="mod">
+          <ac:chgData name="Bin Ahmad Shahrir, Ahmad Faris Durrani" userId="954f8fee-853d-473d-b74c-b345ae6d86a0" providerId="ADAL" clId="{E5BA1A89-EBF5-4CB7-B66D-D9C98733EBEC}" dt="2021-11-19T04:30:44.743" v="11"/>
+          <ac:spMkLst>
+            <pc:docMk/>
+            <pc:sldMasterMk cId="1221472670" sldId="2147483660"/>
+            <ac:spMk id="4" creationId="{00000000-0000-0000-0000-000000000000}"/>
+          </ac:spMkLst>
+        </pc:spChg>
+        <pc:spChg chg="mod">
+          <ac:chgData name="Bin Ahmad Shahrir, Ahmad Faris Durrani" userId="954f8fee-853d-473d-b74c-b345ae6d86a0" providerId="ADAL" clId="{E5BA1A89-EBF5-4CB7-B66D-D9C98733EBEC}" dt="2021-11-19T04:30:44.743" v="11"/>
+          <ac:spMkLst>
+            <pc:docMk/>
+            <pc:sldMasterMk cId="1221472670" sldId="2147483660"/>
+            <ac:spMk id="5" creationId="{00000000-0000-0000-0000-000000000000}"/>
+          </ac:spMkLst>
+        </pc:spChg>
+        <pc:spChg chg="mod">
+          <ac:chgData name="Bin Ahmad Shahrir, Ahmad Faris Durrani" userId="954f8fee-853d-473d-b74c-b345ae6d86a0" providerId="ADAL" clId="{E5BA1A89-EBF5-4CB7-B66D-D9C98733EBEC}" dt="2021-11-19T04:30:44.743" v="11"/>
+          <ac:spMkLst>
+            <pc:docMk/>
+            <pc:sldMasterMk cId="1221472670" sldId="2147483660"/>
+            <ac:spMk id="6" creationId="{00000000-0000-0000-0000-000000000000}"/>
+          </ac:spMkLst>
+        </pc:spChg>
+        <pc:sldLayoutChg chg="modSp">
+          <pc:chgData name="Bin Ahmad Shahrir, Ahmad Faris Durrani" userId="954f8fee-853d-473d-b74c-b345ae6d86a0" providerId="ADAL" clId="{E5BA1A89-EBF5-4CB7-B66D-D9C98733EBEC}" dt="2021-11-19T04:30:44.743" v="11"/>
+          <pc:sldLayoutMkLst>
+            <pc:docMk/>
+            <pc:sldMasterMk cId="1221472670" sldId="2147483660"/>
+            <pc:sldLayoutMk cId="999866577" sldId="2147483661"/>
+          </pc:sldLayoutMkLst>
+          <pc:spChg chg="mod">
+            <ac:chgData name="Bin Ahmad Shahrir, Ahmad Faris Durrani" userId="954f8fee-853d-473d-b74c-b345ae6d86a0" providerId="ADAL" clId="{E5BA1A89-EBF5-4CB7-B66D-D9C98733EBEC}" dt="2021-11-19T04:30:44.743" v="11"/>
+            <ac:spMkLst>
+              <pc:docMk/>
+              <pc:sldMasterMk cId="1221472670" sldId="2147483660"/>
+              <pc:sldLayoutMk cId="999866577" sldId="2147483661"/>
+              <ac:spMk id="2" creationId="{00000000-0000-0000-0000-000000000000}"/>
+            </ac:spMkLst>
+          </pc:spChg>
+          <pc:spChg chg="mod">
+            <ac:chgData name="Bin Ahmad Shahrir, Ahmad Faris Durrani" userId="954f8fee-853d-473d-b74c-b345ae6d86a0" providerId="ADAL" clId="{E5BA1A89-EBF5-4CB7-B66D-D9C98733EBEC}" dt="2021-11-19T04:30:44.743" v="11"/>
+            <ac:spMkLst>
+              <pc:docMk/>
+              <pc:sldMasterMk cId="1221472670" sldId="2147483660"/>
+              <pc:sldLayoutMk cId="999866577" sldId="2147483661"/>
+              <ac:spMk id="3" creationId="{00000000-0000-0000-0000-000000000000}"/>
+            </ac:spMkLst>
+          </pc:spChg>
+        </pc:sldLayoutChg>
+        <pc:sldLayoutChg chg="modSp">
+          <pc:chgData name="Bin Ahmad Shahrir, Ahmad Faris Durrani" userId="954f8fee-853d-473d-b74c-b345ae6d86a0" providerId="ADAL" clId="{E5BA1A89-EBF5-4CB7-B66D-D9C98733EBEC}" dt="2021-11-19T04:30:44.743" v="11"/>
+          <pc:sldLayoutMkLst>
+            <pc:docMk/>
+            <pc:sldMasterMk cId="1221472670" sldId="2147483660"/>
+            <pc:sldLayoutMk cId="938857261" sldId="2147483663"/>
+          </pc:sldLayoutMkLst>
+          <pc:spChg chg="mod">
+            <ac:chgData name="Bin Ahmad Shahrir, Ahmad Faris Durrani" userId="954f8fee-853d-473d-b74c-b345ae6d86a0" providerId="ADAL" clId="{E5BA1A89-EBF5-4CB7-B66D-D9C98733EBEC}" dt="2021-11-19T04:30:44.743" v="11"/>
+            <ac:spMkLst>
+              <pc:docMk/>
+              <pc:sldMasterMk cId="1221472670" sldId="2147483660"/>
+              <pc:sldLayoutMk cId="938857261" sldId="2147483663"/>
+              <ac:spMk id="2" creationId="{00000000-0000-0000-0000-000000000000}"/>
+            </ac:spMkLst>
+          </pc:spChg>
+          <pc:spChg chg="mod">
+            <ac:chgData name="Bin Ahmad Shahrir, Ahmad Faris Durrani" userId="954f8fee-853d-473d-b74c-b345ae6d86a0" providerId="ADAL" clId="{E5BA1A89-EBF5-4CB7-B66D-D9C98733EBEC}" dt="2021-11-19T04:30:44.743" v="11"/>
+            <ac:spMkLst>
+              <pc:docMk/>
+              <pc:sldMasterMk cId="1221472670" sldId="2147483660"/>
+              <pc:sldLayoutMk cId="938857261" sldId="2147483663"/>
+              <ac:spMk id="3" creationId="{00000000-0000-0000-0000-000000000000}"/>
+            </ac:spMkLst>
+          </pc:spChg>
+        </pc:sldLayoutChg>
+        <pc:sldLayoutChg chg="modSp">
+          <pc:chgData name="Bin Ahmad Shahrir, Ahmad Faris Durrani" userId="954f8fee-853d-473d-b74c-b345ae6d86a0" providerId="ADAL" clId="{E5BA1A89-EBF5-4CB7-B66D-D9C98733EBEC}" dt="2021-11-19T04:30:44.743" v="11"/>
+          <pc:sldLayoutMkLst>
+            <pc:docMk/>
+            <pc:sldMasterMk cId="1221472670" sldId="2147483660"/>
+            <pc:sldLayoutMk cId="662996571" sldId="2147483664"/>
+          </pc:sldLayoutMkLst>
+          <pc:spChg chg="mod">
+            <ac:chgData name="Bin Ahmad Shahrir, Ahmad Faris Durrani" userId="954f8fee-853d-473d-b74c-b345ae6d86a0" providerId="ADAL" clId="{E5BA1A89-EBF5-4CB7-B66D-D9C98733EBEC}" dt="2021-11-19T04:30:44.743" v="11"/>
+            <ac:spMkLst>
+              <pc:docMk/>
+              <pc:sldMasterMk cId="1221472670" sldId="2147483660"/>
+              <pc:sldLayoutMk cId="662996571" sldId="2147483664"/>
+              <ac:spMk id="3" creationId="{00000000-0000-0000-0000-000000000000}"/>
+            </ac:spMkLst>
+          </pc:spChg>
+          <pc:spChg chg="mod">
+            <ac:chgData name="Bin Ahmad Shahrir, Ahmad Faris Durrani" userId="954f8fee-853d-473d-b74c-b345ae6d86a0" providerId="ADAL" clId="{E5BA1A89-EBF5-4CB7-B66D-D9C98733EBEC}" dt="2021-11-19T04:30:44.743" v="11"/>
+            <ac:spMkLst>
+              <pc:docMk/>
+              <pc:sldMasterMk cId="1221472670" sldId="2147483660"/>
+              <pc:sldLayoutMk cId="662996571" sldId="2147483664"/>
+              <ac:spMk id="4" creationId="{00000000-0000-0000-0000-000000000000}"/>
+            </ac:spMkLst>
+          </pc:spChg>
+        </pc:sldLayoutChg>
+        <pc:sldLayoutChg chg="modSp">
+          <pc:chgData name="Bin Ahmad Shahrir, Ahmad Faris Durrani" userId="954f8fee-853d-473d-b74c-b345ae6d86a0" providerId="ADAL" clId="{E5BA1A89-EBF5-4CB7-B66D-D9C98733EBEC}" dt="2021-11-19T04:30:44.743" v="11"/>
+          <pc:sldLayoutMkLst>
+            <pc:docMk/>
+            <pc:sldMasterMk cId="1221472670" sldId="2147483660"/>
+            <pc:sldLayoutMk cId="2230446647" sldId="2147483665"/>
+          </pc:sldLayoutMkLst>
+          <pc:spChg chg="mod">
+            <ac:chgData name="Bin Ahmad Shahrir, Ahmad Faris Durrani" userId="954f8fee-853d-473d-b74c-b345ae6d86a0" providerId="ADAL" clId="{E5BA1A89-EBF5-4CB7-B66D-D9C98733EBEC}" dt="2021-11-19T04:30:44.743" v="11"/>
+            <ac:spMkLst>
+              <pc:docMk/>
+              <pc:sldMasterMk cId="1221472670" sldId="2147483660"/>
+              <pc:sldLayoutMk cId="2230446647" sldId="2147483665"/>
+              <ac:spMk id="2" creationId="{00000000-0000-0000-0000-000000000000}"/>
+            </ac:spMkLst>
+          </pc:spChg>
+          <pc:spChg chg="mod">
+            <ac:chgData name="Bin Ahmad Shahrir, Ahmad Faris Durrani" userId="954f8fee-853d-473d-b74c-b345ae6d86a0" providerId="ADAL" clId="{E5BA1A89-EBF5-4CB7-B66D-D9C98733EBEC}" dt="2021-11-19T04:30:44.743" v="11"/>
+            <ac:spMkLst>
+              <pc:docMk/>
+              <pc:sldMasterMk cId="1221472670" sldId="2147483660"/>
+              <pc:sldLayoutMk cId="2230446647" sldId="2147483665"/>
+              <ac:spMk id="3" creationId="{00000000-0000-0000-0000-000000000000}"/>
+            </ac:spMkLst>
+          </pc:spChg>
+          <pc:spChg chg="mod">
+            <ac:chgData name="Bin Ahmad Shahrir, Ahmad Faris Durrani" userId="954f8fee-853d-473d-b74c-b345ae6d86a0" providerId="ADAL" clId="{E5BA1A89-EBF5-4CB7-B66D-D9C98733EBEC}" dt="2021-11-19T04:30:44.743" v="11"/>
+            <ac:spMkLst>
+              <pc:docMk/>
+              <pc:sldMasterMk cId="1221472670" sldId="2147483660"/>
+              <pc:sldLayoutMk cId="2230446647" sldId="2147483665"/>
+              <ac:spMk id="4" creationId="{00000000-0000-0000-0000-000000000000}"/>
+            </ac:spMkLst>
+          </pc:spChg>
+          <pc:spChg chg="mod">
+            <ac:chgData name="Bin Ahmad Shahrir, Ahmad Faris Durrani" userId="954f8fee-853d-473d-b74c-b345ae6d86a0" providerId="ADAL" clId="{E5BA1A89-EBF5-4CB7-B66D-D9C98733EBEC}" dt="2021-11-19T04:30:44.743" v="11"/>
+            <ac:spMkLst>
+              <pc:docMk/>
+              <pc:sldMasterMk cId="1221472670" sldId="2147483660"/>
+              <pc:sldLayoutMk cId="2230446647" sldId="2147483665"/>
+              <ac:spMk id="5" creationId="{00000000-0000-0000-0000-000000000000}"/>
+            </ac:spMkLst>
+          </pc:spChg>
+          <pc:spChg chg="mod">
+            <ac:chgData name="Bin Ahmad Shahrir, Ahmad Faris Durrani" userId="954f8fee-853d-473d-b74c-b345ae6d86a0" providerId="ADAL" clId="{E5BA1A89-EBF5-4CB7-B66D-D9C98733EBEC}" dt="2021-11-19T04:30:44.743" v="11"/>
+            <ac:spMkLst>
+              <pc:docMk/>
+              <pc:sldMasterMk cId="1221472670" sldId="2147483660"/>
+              <pc:sldLayoutMk cId="2230446647" sldId="2147483665"/>
+              <ac:spMk id="6" creationId="{00000000-0000-0000-0000-000000000000}"/>
+            </ac:spMkLst>
+          </pc:spChg>
+        </pc:sldLayoutChg>
+        <pc:sldLayoutChg chg="modSp">
+          <pc:chgData name="Bin Ahmad Shahrir, Ahmad Faris Durrani" userId="954f8fee-853d-473d-b74c-b345ae6d86a0" providerId="ADAL" clId="{E5BA1A89-EBF5-4CB7-B66D-D9C98733EBEC}" dt="2021-11-19T04:30:44.743" v="11"/>
+          <pc:sldLayoutMkLst>
+            <pc:docMk/>
+            <pc:sldMasterMk cId="1221472670" sldId="2147483660"/>
+            <pc:sldLayoutMk cId="3354646326" sldId="2147483668"/>
+          </pc:sldLayoutMkLst>
+          <pc:spChg chg="mod">
+            <ac:chgData name="Bin Ahmad Shahrir, Ahmad Faris Durrani" userId="954f8fee-853d-473d-b74c-b345ae6d86a0" providerId="ADAL" clId="{E5BA1A89-EBF5-4CB7-B66D-D9C98733EBEC}" dt="2021-11-19T04:30:44.743" v="11"/>
+            <ac:spMkLst>
+              <pc:docMk/>
+              <pc:sldMasterMk cId="1221472670" sldId="2147483660"/>
+              <pc:sldLayoutMk cId="3354646326" sldId="2147483668"/>
+              <ac:spMk id="2" creationId="{00000000-0000-0000-0000-000000000000}"/>
+            </ac:spMkLst>
+          </pc:spChg>
+          <pc:spChg chg="mod">
+            <ac:chgData name="Bin Ahmad Shahrir, Ahmad Faris Durrani" userId="954f8fee-853d-473d-b74c-b345ae6d86a0" providerId="ADAL" clId="{E5BA1A89-EBF5-4CB7-B66D-D9C98733EBEC}" dt="2021-11-19T04:30:44.743" v="11"/>
+            <ac:spMkLst>
+              <pc:docMk/>
+              <pc:sldMasterMk cId="1221472670" sldId="2147483660"/>
+              <pc:sldLayoutMk cId="3354646326" sldId="2147483668"/>
+              <ac:spMk id="3" creationId="{00000000-0000-0000-0000-000000000000}"/>
+            </ac:spMkLst>
+          </pc:spChg>
+          <pc:spChg chg="mod">
+            <ac:chgData name="Bin Ahmad Shahrir, Ahmad Faris Durrani" userId="954f8fee-853d-473d-b74c-b345ae6d86a0" providerId="ADAL" clId="{E5BA1A89-EBF5-4CB7-B66D-D9C98733EBEC}" dt="2021-11-19T04:30:44.743" v="11"/>
+            <ac:spMkLst>
+              <pc:docMk/>
+              <pc:sldMasterMk cId="1221472670" sldId="2147483660"/>
+              <pc:sldLayoutMk cId="3354646326" sldId="2147483668"/>
+              <ac:spMk id="4" creationId="{00000000-0000-0000-0000-000000000000}"/>
+            </ac:spMkLst>
+          </pc:spChg>
+        </pc:sldLayoutChg>
+        <pc:sldLayoutChg chg="modSp">
+          <pc:chgData name="Bin Ahmad Shahrir, Ahmad Faris Durrani" userId="954f8fee-853d-473d-b74c-b345ae6d86a0" providerId="ADAL" clId="{E5BA1A89-EBF5-4CB7-B66D-D9C98733EBEC}" dt="2021-11-19T04:30:44.743" v="11"/>
+          <pc:sldLayoutMkLst>
+            <pc:docMk/>
+            <pc:sldMasterMk cId="1221472670" sldId="2147483660"/>
+            <pc:sldLayoutMk cId="3289207310" sldId="2147483669"/>
+          </pc:sldLayoutMkLst>
+          <pc:spChg chg="mod">
+            <ac:chgData name="Bin Ahmad Shahrir, Ahmad Faris Durrani" userId="954f8fee-853d-473d-b74c-b345ae6d86a0" providerId="ADAL" clId="{E5BA1A89-EBF5-4CB7-B66D-D9C98733EBEC}" dt="2021-11-19T04:30:44.743" v="11"/>
+            <ac:spMkLst>
+              <pc:docMk/>
+              <pc:sldMasterMk cId="1221472670" sldId="2147483660"/>
+              <pc:sldLayoutMk cId="3289207310" sldId="2147483669"/>
+              <ac:spMk id="2" creationId="{00000000-0000-0000-0000-000000000000}"/>
+            </ac:spMkLst>
+          </pc:spChg>
+          <pc:spChg chg="mod">
+            <ac:chgData name="Bin Ahmad Shahrir, Ahmad Faris Durrani" userId="954f8fee-853d-473d-b74c-b345ae6d86a0" providerId="ADAL" clId="{E5BA1A89-EBF5-4CB7-B66D-D9C98733EBEC}" dt="2021-11-19T04:30:44.743" v="11"/>
+            <ac:spMkLst>
+              <pc:docMk/>
+              <pc:sldMasterMk cId="1221472670" sldId="2147483660"/>
+              <pc:sldLayoutMk cId="3289207310" sldId="2147483669"/>
+              <ac:spMk id="3" creationId="{00000000-0000-0000-0000-000000000000}"/>
+            </ac:spMkLst>
+          </pc:spChg>
+          <pc:spChg chg="mod">
+            <ac:chgData name="Bin Ahmad Shahrir, Ahmad Faris Durrani" userId="954f8fee-853d-473d-b74c-b345ae6d86a0" providerId="ADAL" clId="{E5BA1A89-EBF5-4CB7-B66D-D9C98733EBEC}" dt="2021-11-19T04:30:44.743" v="11"/>
+            <ac:spMkLst>
+              <pc:docMk/>
+              <pc:sldMasterMk cId="1221472670" sldId="2147483660"/>
+              <pc:sldLayoutMk cId="3289207310" sldId="2147483669"/>
+              <ac:spMk id="4" creationId="{00000000-0000-0000-0000-000000000000}"/>
+            </ac:spMkLst>
+          </pc:spChg>
+        </pc:sldLayoutChg>
+        <pc:sldLayoutChg chg="modSp">
+          <pc:chgData name="Bin Ahmad Shahrir, Ahmad Faris Durrani" userId="954f8fee-853d-473d-b74c-b345ae6d86a0" providerId="ADAL" clId="{E5BA1A89-EBF5-4CB7-B66D-D9C98733EBEC}" dt="2021-11-19T04:30:44.743" v="11"/>
+          <pc:sldLayoutMkLst>
+            <pc:docMk/>
+            <pc:sldMasterMk cId="1221472670" sldId="2147483660"/>
+            <pc:sldLayoutMk cId="3481438538" sldId="2147483671"/>
+          </pc:sldLayoutMkLst>
+          <pc:spChg chg="mod">
+            <ac:chgData name="Bin Ahmad Shahrir, Ahmad Faris Durrani" userId="954f8fee-853d-473d-b74c-b345ae6d86a0" providerId="ADAL" clId="{E5BA1A89-EBF5-4CB7-B66D-D9C98733EBEC}" dt="2021-11-19T04:30:44.743" v="11"/>
+            <ac:spMkLst>
+              <pc:docMk/>
+              <pc:sldMasterMk cId="1221472670" sldId="2147483660"/>
+              <pc:sldLayoutMk cId="3481438538" sldId="2147483671"/>
+              <ac:spMk id="2" creationId="{00000000-0000-0000-0000-000000000000}"/>
+            </ac:spMkLst>
+          </pc:spChg>
+          <pc:spChg chg="mod">
+            <ac:chgData name="Bin Ahmad Shahrir, Ahmad Faris Durrani" userId="954f8fee-853d-473d-b74c-b345ae6d86a0" providerId="ADAL" clId="{E5BA1A89-EBF5-4CB7-B66D-D9C98733EBEC}" dt="2021-11-19T04:30:44.743" v="11"/>
+            <ac:spMkLst>
+              <pc:docMk/>
+              <pc:sldMasterMk cId="1221472670" sldId="2147483660"/>
+              <pc:sldLayoutMk cId="3481438538" sldId="2147483671"/>
+              <ac:spMk id="3" creationId="{00000000-0000-0000-0000-000000000000}"/>
+            </ac:spMkLst>
+          </pc:spChg>
+        </pc:sldLayoutChg>
+      </pc:sldMasterChg>
     </pc:docChg>
   </pc:docChgLst>
 </pc:chgInfo>
@@ -282,15 +618,15 @@
         </p:nvSpPr>
         <p:spPr>
           <a:xfrm>
-            <a:off x="137160" y="299297"/>
-            <a:ext cx="1554480" cy="636693"/>
+            <a:off x="754380" y="1646133"/>
+            <a:ext cx="8549640" cy="3501813"/>
           </a:xfrm>
         </p:spPr>
         <p:txBody>
           <a:bodyPr anchor="b"/>
           <a:lstStyle>
             <a:lvl1pPr algn="ctr">
-              <a:defRPr sz="1200"/>
+              <a:defRPr sz="6600"/>
             </a:lvl1pPr>
           </a:lstStyle>
           <a:p>
@@ -314,8 +650,8 @@
         </p:nvSpPr>
         <p:spPr>
           <a:xfrm>
-            <a:off x="228600" y="960543"/>
-            <a:ext cx="1371600" cy="441537"/>
+            <a:off x="1257300" y="5282989"/>
+            <a:ext cx="7543800" cy="2428451"/>
           </a:xfrm>
         </p:spPr>
         <p:txBody>
@@ -323,39 +659,39 @@
           <a:lstStyle>
             <a:lvl1pPr marL="0" indent="0" algn="ctr">
               <a:buNone/>
-              <a:defRPr sz="480"/>
+              <a:defRPr sz="2640"/>
             </a:lvl1pPr>
-            <a:lvl2pPr marL="91440" indent="0" algn="ctr">
-              <a:buNone/>
-              <a:defRPr sz="400"/>
+            <a:lvl2pPr marL="502920" indent="0" algn="ctr">
+              <a:buNone/>
+              <a:defRPr sz="2200"/>
             </a:lvl2pPr>
-            <a:lvl3pPr marL="182880" indent="0" algn="ctr">
-              <a:buNone/>
-              <a:defRPr sz="360"/>
+            <a:lvl3pPr marL="1005840" indent="0" algn="ctr">
+              <a:buNone/>
+              <a:defRPr sz="1980"/>
             </a:lvl3pPr>
-            <a:lvl4pPr marL="274320" indent="0" algn="ctr">
-              <a:buNone/>
-              <a:defRPr sz="320"/>
+            <a:lvl4pPr marL="1508760" indent="0" algn="ctr">
+              <a:buNone/>
+              <a:defRPr sz="1760"/>
             </a:lvl4pPr>
-            <a:lvl5pPr marL="365760" indent="0" algn="ctr">
-              <a:buNone/>
-              <a:defRPr sz="320"/>
+            <a:lvl5pPr marL="2011680" indent="0" algn="ctr">
+              <a:buNone/>
+              <a:defRPr sz="1760"/>
             </a:lvl5pPr>
-            <a:lvl6pPr marL="457200" indent="0" algn="ctr">
-              <a:buNone/>
-              <a:defRPr sz="320"/>
+            <a:lvl6pPr marL="2514600" indent="0" algn="ctr">
+              <a:buNone/>
+              <a:defRPr sz="1760"/>
             </a:lvl6pPr>
-            <a:lvl7pPr marL="548640" indent="0" algn="ctr">
-              <a:buNone/>
-              <a:defRPr sz="320"/>
+            <a:lvl7pPr marL="3017520" indent="0" algn="ctr">
+              <a:buNone/>
+              <a:defRPr sz="1760"/>
             </a:lvl7pPr>
-            <a:lvl8pPr marL="640080" indent="0" algn="ctr">
-              <a:buNone/>
-              <a:defRPr sz="320"/>
+            <a:lvl8pPr marL="3520440" indent="0" algn="ctr">
+              <a:buNone/>
+              <a:defRPr sz="1760"/>
             </a:lvl8pPr>
-            <a:lvl9pPr marL="731520" indent="0" algn="ctr">
-              <a:buNone/>
-              <a:defRPr sz="320"/>
+            <a:lvl9pPr marL="4023360" indent="0" algn="ctr">
+              <a:buNone/>
+              <a:defRPr sz="1760"/>
             </a:lvl9pPr>
           </a:lstStyle>
           <a:p>
@@ -384,7 +720,7 @@
           <a:p>
             <a:fld id="{18EE90AF-9406-4728-9C06-C25B5621831A}" type="datetimeFigureOut">
               <a:rPr lang="en-US" smtClean="0"/>
-              <a:t>11/13/2021</a:t>
+              <a:t>11/18/2021</a:t>
             </a:fld>
             <a:endParaRPr lang="en-US"/>
           </a:p>
@@ -435,7 +771,7 @@
     </p:spTree>
     <p:extLst>
       <p:ext uri="{BB962C8B-B14F-4D97-AF65-F5344CB8AC3E}">
-        <p14:creationId xmlns:p14="http://schemas.microsoft.com/office/powerpoint/2010/main" val="999866577"/>
+        <p14:creationId xmlns:p14="http://schemas.microsoft.com/office/powerpoint/2010/main" val="3334017038"/>
       </p:ext>
     </p:extLst>
   </p:cSld>
@@ -554,7 +890,7 @@
           <a:p>
             <a:fld id="{18EE90AF-9406-4728-9C06-C25B5621831A}" type="datetimeFigureOut">
               <a:rPr lang="en-US" smtClean="0"/>
-              <a:t>11/13/2021</a:t>
+              <a:t>11/18/2021</a:t>
             </a:fld>
             <a:endParaRPr lang="en-US"/>
           </a:p>
@@ -605,7 +941,7 @@
     </p:spTree>
     <p:extLst>
       <p:ext uri="{BB962C8B-B14F-4D97-AF65-F5344CB8AC3E}">
-        <p14:creationId xmlns:p14="http://schemas.microsoft.com/office/powerpoint/2010/main" val="747060510"/>
+        <p14:creationId xmlns:p14="http://schemas.microsoft.com/office/powerpoint/2010/main" val="3902597209"/>
       </p:ext>
     </p:extLst>
   </p:cSld>
@@ -644,8 +980,8 @@
         </p:nvSpPr>
         <p:spPr>
           <a:xfrm>
-            <a:off x="1308735" y="97367"/>
-            <a:ext cx="394335" cy="1549823"/>
+            <a:off x="7198043" y="535517"/>
+            <a:ext cx="2168843" cy="8524029"/>
           </a:xfrm>
         </p:spPr>
         <p:txBody>
@@ -672,8 +1008,8 @@
         </p:nvSpPr>
         <p:spPr>
           <a:xfrm>
-            <a:off x="125730" y="97367"/>
-            <a:ext cx="1160145" cy="1549823"/>
+            <a:off x="691515" y="535517"/>
+            <a:ext cx="6380798" cy="8524029"/>
           </a:xfrm>
         </p:spPr>
         <p:txBody>
@@ -734,7 +1070,7 @@
           <a:p>
             <a:fld id="{18EE90AF-9406-4728-9C06-C25B5621831A}" type="datetimeFigureOut">
               <a:rPr lang="en-US" smtClean="0"/>
-              <a:t>11/13/2021</a:t>
+              <a:t>11/18/2021</a:t>
             </a:fld>
             <a:endParaRPr lang="en-US"/>
           </a:p>
@@ -785,7 +1121,7 @@
     </p:spTree>
     <p:extLst>
       <p:ext uri="{BB962C8B-B14F-4D97-AF65-F5344CB8AC3E}">
-        <p14:creationId xmlns:p14="http://schemas.microsoft.com/office/powerpoint/2010/main" val="3481438538"/>
+        <p14:creationId xmlns:p14="http://schemas.microsoft.com/office/powerpoint/2010/main" val="2725178823"/>
       </p:ext>
     </p:extLst>
   </p:cSld>
@@ -904,7 +1240,7 @@
           <a:p>
             <a:fld id="{18EE90AF-9406-4728-9C06-C25B5621831A}" type="datetimeFigureOut">
               <a:rPr lang="en-US" smtClean="0"/>
-              <a:t>11/13/2021</a:t>
+              <a:t>11/18/2021</a:t>
             </a:fld>
             <a:endParaRPr lang="en-US"/>
           </a:p>
@@ -955,7 +1291,7 @@
     </p:spTree>
     <p:extLst>
       <p:ext uri="{BB962C8B-B14F-4D97-AF65-F5344CB8AC3E}">
-        <p14:creationId xmlns:p14="http://schemas.microsoft.com/office/powerpoint/2010/main" val="1766766606"/>
+        <p14:creationId xmlns:p14="http://schemas.microsoft.com/office/powerpoint/2010/main" val="2016919237"/>
       </p:ext>
     </p:extLst>
   </p:cSld>
@@ -994,15 +1330,15 @@
         </p:nvSpPr>
         <p:spPr>
           <a:xfrm>
-            <a:off x="124778" y="455930"/>
-            <a:ext cx="1577340" cy="760730"/>
+            <a:off x="686277" y="2507618"/>
+            <a:ext cx="8675370" cy="4184014"/>
           </a:xfrm>
         </p:spPr>
         <p:txBody>
           <a:bodyPr anchor="b"/>
           <a:lstStyle>
             <a:lvl1pPr>
-              <a:defRPr sz="1200"/>
+              <a:defRPr sz="6600"/>
             </a:lvl1pPr>
           </a:lstStyle>
           <a:p>
@@ -1026,8 +1362,8 @@
         </p:nvSpPr>
         <p:spPr>
           <a:xfrm>
-            <a:off x="124778" y="1223857"/>
-            <a:ext cx="1577340" cy="400050"/>
+            <a:off x="686277" y="6731215"/>
+            <a:ext cx="8675370" cy="2200274"/>
           </a:xfrm>
         </p:spPr>
         <p:txBody>
@@ -1035,15 +1371,15 @@
           <a:lstStyle>
             <a:lvl1pPr marL="0" indent="0">
               <a:buNone/>
-              <a:defRPr sz="480">
+              <a:defRPr sz="2640">
                 <a:solidFill>
                   <a:schemeClr val="tx1"/>
                 </a:solidFill>
               </a:defRPr>
             </a:lvl1pPr>
-            <a:lvl2pPr marL="91440" indent="0">
-              <a:buNone/>
-              <a:defRPr sz="400">
+            <a:lvl2pPr marL="502920" indent="0">
+              <a:buNone/>
+              <a:defRPr sz="2200">
                 <a:solidFill>
                   <a:schemeClr val="tx1">
                     <a:tint val="75000"/>
@@ -1051,9 +1387,9 @@
                 </a:solidFill>
               </a:defRPr>
             </a:lvl2pPr>
-            <a:lvl3pPr marL="182880" indent="0">
-              <a:buNone/>
-              <a:defRPr sz="360">
+            <a:lvl3pPr marL="1005840" indent="0">
+              <a:buNone/>
+              <a:defRPr sz="1980">
                 <a:solidFill>
                   <a:schemeClr val="tx1">
                     <a:tint val="75000"/>
@@ -1061,9 +1397,9 @@
                 </a:solidFill>
               </a:defRPr>
             </a:lvl3pPr>
-            <a:lvl4pPr marL="274320" indent="0">
-              <a:buNone/>
-              <a:defRPr sz="320">
+            <a:lvl4pPr marL="1508760" indent="0">
+              <a:buNone/>
+              <a:defRPr sz="1760">
                 <a:solidFill>
                   <a:schemeClr val="tx1">
                     <a:tint val="75000"/>
@@ -1071,9 +1407,9 @@
                 </a:solidFill>
               </a:defRPr>
             </a:lvl4pPr>
-            <a:lvl5pPr marL="365760" indent="0">
-              <a:buNone/>
-              <a:defRPr sz="320">
+            <a:lvl5pPr marL="2011680" indent="0">
+              <a:buNone/>
+              <a:defRPr sz="1760">
                 <a:solidFill>
                   <a:schemeClr val="tx1">
                     <a:tint val="75000"/>
@@ -1081,9 +1417,9 @@
                 </a:solidFill>
               </a:defRPr>
             </a:lvl5pPr>
-            <a:lvl6pPr marL="457200" indent="0">
-              <a:buNone/>
-              <a:defRPr sz="320">
+            <a:lvl6pPr marL="2514600" indent="0">
+              <a:buNone/>
+              <a:defRPr sz="1760">
                 <a:solidFill>
                   <a:schemeClr val="tx1">
                     <a:tint val="75000"/>
@@ -1091,9 +1427,9 @@
                 </a:solidFill>
               </a:defRPr>
             </a:lvl6pPr>
-            <a:lvl7pPr marL="548640" indent="0">
-              <a:buNone/>
-              <a:defRPr sz="320">
+            <a:lvl7pPr marL="3017520" indent="0">
+              <a:buNone/>
+              <a:defRPr sz="1760">
                 <a:solidFill>
                   <a:schemeClr val="tx1">
                     <a:tint val="75000"/>
@@ -1101,9 +1437,9 @@
                 </a:solidFill>
               </a:defRPr>
             </a:lvl7pPr>
-            <a:lvl8pPr marL="640080" indent="0">
-              <a:buNone/>
-              <a:defRPr sz="320">
+            <a:lvl8pPr marL="3520440" indent="0">
+              <a:buNone/>
+              <a:defRPr sz="1760">
                 <a:solidFill>
                   <a:schemeClr val="tx1">
                     <a:tint val="75000"/>
@@ -1111,9 +1447,9 @@
                 </a:solidFill>
               </a:defRPr>
             </a:lvl8pPr>
-            <a:lvl9pPr marL="731520" indent="0">
-              <a:buNone/>
-              <a:defRPr sz="320">
+            <a:lvl9pPr marL="4023360" indent="0">
+              <a:buNone/>
+              <a:defRPr sz="1760">
                 <a:solidFill>
                   <a:schemeClr val="tx1">
                     <a:tint val="75000"/>
@@ -1148,7 +1484,7 @@
           <a:p>
             <a:fld id="{18EE90AF-9406-4728-9C06-C25B5621831A}" type="datetimeFigureOut">
               <a:rPr lang="en-US" smtClean="0"/>
-              <a:t>11/13/2021</a:t>
+              <a:t>11/18/2021</a:t>
             </a:fld>
             <a:endParaRPr lang="en-US"/>
           </a:p>
@@ -1199,7 +1535,7 @@
     </p:spTree>
     <p:extLst>
       <p:ext uri="{BB962C8B-B14F-4D97-AF65-F5344CB8AC3E}">
-        <p14:creationId xmlns:p14="http://schemas.microsoft.com/office/powerpoint/2010/main" val="938857261"/>
+        <p14:creationId xmlns:p14="http://schemas.microsoft.com/office/powerpoint/2010/main" val="386600165"/>
       </p:ext>
     </p:extLst>
   </p:cSld>
@@ -1261,8 +1597,8 @@
         </p:nvSpPr>
         <p:spPr>
           <a:xfrm>
-            <a:off x="125730" y="486833"/>
-            <a:ext cx="777240" cy="1160357"/>
+            <a:off x="691515" y="2677584"/>
+            <a:ext cx="4274820" cy="6381962"/>
           </a:xfrm>
         </p:spPr>
         <p:txBody>
@@ -1318,8 +1654,8 @@
         </p:nvSpPr>
         <p:spPr>
           <a:xfrm>
-            <a:off x="925830" y="486833"/>
-            <a:ext cx="777240" cy="1160357"/>
+            <a:off x="5092065" y="2677584"/>
+            <a:ext cx="4274820" cy="6381962"/>
           </a:xfrm>
         </p:spPr>
         <p:txBody>
@@ -1380,7 +1716,7 @@
           <a:p>
             <a:fld id="{18EE90AF-9406-4728-9C06-C25B5621831A}" type="datetimeFigureOut">
               <a:rPr lang="en-US" smtClean="0"/>
-              <a:t>11/13/2021</a:t>
+              <a:t>11/18/2021</a:t>
             </a:fld>
             <a:endParaRPr lang="en-US"/>
           </a:p>
@@ -1431,7 +1767,7 @@
     </p:spTree>
     <p:extLst>
       <p:ext uri="{BB962C8B-B14F-4D97-AF65-F5344CB8AC3E}">
-        <p14:creationId xmlns:p14="http://schemas.microsoft.com/office/powerpoint/2010/main" val="662996571"/>
+        <p14:creationId xmlns:p14="http://schemas.microsoft.com/office/powerpoint/2010/main" val="2793447324"/>
       </p:ext>
     </p:extLst>
   </p:cSld>
@@ -1470,8 +1806,8 @@
         </p:nvSpPr>
         <p:spPr>
           <a:xfrm>
-            <a:off x="125968" y="97367"/>
-            <a:ext cx="1577340" cy="353483"/>
+            <a:off x="692825" y="535519"/>
+            <a:ext cx="8675370" cy="1944159"/>
           </a:xfrm>
         </p:spPr>
         <p:txBody>
@@ -1498,8 +1834,8 @@
         </p:nvSpPr>
         <p:spPr>
           <a:xfrm>
-            <a:off x="125968" y="448310"/>
-            <a:ext cx="773668" cy="219710"/>
+            <a:off x="692826" y="2465706"/>
+            <a:ext cx="4255174" cy="1208404"/>
           </a:xfrm>
         </p:spPr>
         <p:txBody>
@@ -1507,39 +1843,39 @@
           <a:lstStyle>
             <a:lvl1pPr marL="0" indent="0">
               <a:buNone/>
-              <a:defRPr sz="480" b="1"/>
+              <a:defRPr sz="2640" b="1"/>
             </a:lvl1pPr>
-            <a:lvl2pPr marL="91440" indent="0">
-              <a:buNone/>
-              <a:defRPr sz="400" b="1"/>
+            <a:lvl2pPr marL="502920" indent="0">
+              <a:buNone/>
+              <a:defRPr sz="2200" b="1"/>
             </a:lvl2pPr>
-            <a:lvl3pPr marL="182880" indent="0">
-              <a:buNone/>
-              <a:defRPr sz="360" b="1"/>
+            <a:lvl3pPr marL="1005840" indent="0">
+              <a:buNone/>
+              <a:defRPr sz="1980" b="1"/>
             </a:lvl3pPr>
-            <a:lvl4pPr marL="274320" indent="0">
-              <a:buNone/>
-              <a:defRPr sz="320" b="1"/>
+            <a:lvl4pPr marL="1508760" indent="0">
+              <a:buNone/>
+              <a:defRPr sz="1760" b="1"/>
             </a:lvl4pPr>
-            <a:lvl5pPr marL="365760" indent="0">
-              <a:buNone/>
-              <a:defRPr sz="320" b="1"/>
+            <a:lvl5pPr marL="2011680" indent="0">
+              <a:buNone/>
+              <a:defRPr sz="1760" b="1"/>
             </a:lvl5pPr>
-            <a:lvl6pPr marL="457200" indent="0">
-              <a:buNone/>
-              <a:defRPr sz="320" b="1"/>
+            <a:lvl6pPr marL="2514600" indent="0">
+              <a:buNone/>
+              <a:defRPr sz="1760" b="1"/>
             </a:lvl6pPr>
-            <a:lvl7pPr marL="548640" indent="0">
-              <a:buNone/>
-              <a:defRPr sz="320" b="1"/>
+            <a:lvl7pPr marL="3017520" indent="0">
+              <a:buNone/>
+              <a:defRPr sz="1760" b="1"/>
             </a:lvl7pPr>
-            <a:lvl8pPr marL="640080" indent="0">
-              <a:buNone/>
-              <a:defRPr sz="320" b="1"/>
+            <a:lvl8pPr marL="3520440" indent="0">
+              <a:buNone/>
+              <a:defRPr sz="1760" b="1"/>
             </a:lvl8pPr>
-            <a:lvl9pPr marL="731520" indent="0">
-              <a:buNone/>
-              <a:defRPr sz="320" b="1"/>
+            <a:lvl9pPr marL="4023360" indent="0">
+              <a:buNone/>
+              <a:defRPr sz="1760" b="1"/>
             </a:lvl9pPr>
           </a:lstStyle>
           <a:p>
@@ -1563,8 +1899,8 @@
         </p:nvSpPr>
         <p:spPr>
           <a:xfrm>
-            <a:off x="125968" y="668020"/>
-            <a:ext cx="773668" cy="982557"/>
+            <a:off x="692826" y="3674110"/>
+            <a:ext cx="4255174" cy="5404062"/>
           </a:xfrm>
         </p:spPr>
         <p:txBody>
@@ -1620,8 +1956,8 @@
         </p:nvSpPr>
         <p:spPr>
           <a:xfrm>
-            <a:off x="925830" y="448310"/>
-            <a:ext cx="777478" cy="219710"/>
+            <a:off x="5092066" y="2465706"/>
+            <a:ext cx="4276130" cy="1208404"/>
           </a:xfrm>
         </p:spPr>
         <p:txBody>
@@ -1629,39 +1965,39 @@
           <a:lstStyle>
             <a:lvl1pPr marL="0" indent="0">
               <a:buNone/>
-              <a:defRPr sz="480" b="1"/>
+              <a:defRPr sz="2640" b="1"/>
             </a:lvl1pPr>
-            <a:lvl2pPr marL="91440" indent="0">
-              <a:buNone/>
-              <a:defRPr sz="400" b="1"/>
+            <a:lvl2pPr marL="502920" indent="0">
+              <a:buNone/>
+              <a:defRPr sz="2200" b="1"/>
             </a:lvl2pPr>
-            <a:lvl3pPr marL="182880" indent="0">
-              <a:buNone/>
-              <a:defRPr sz="360" b="1"/>
+            <a:lvl3pPr marL="1005840" indent="0">
+              <a:buNone/>
+              <a:defRPr sz="1980" b="1"/>
             </a:lvl3pPr>
-            <a:lvl4pPr marL="274320" indent="0">
-              <a:buNone/>
-              <a:defRPr sz="320" b="1"/>
+            <a:lvl4pPr marL="1508760" indent="0">
+              <a:buNone/>
+              <a:defRPr sz="1760" b="1"/>
             </a:lvl4pPr>
-            <a:lvl5pPr marL="365760" indent="0">
-              <a:buNone/>
-              <a:defRPr sz="320" b="1"/>
+            <a:lvl5pPr marL="2011680" indent="0">
+              <a:buNone/>
+              <a:defRPr sz="1760" b="1"/>
             </a:lvl5pPr>
-            <a:lvl6pPr marL="457200" indent="0">
-              <a:buNone/>
-              <a:defRPr sz="320" b="1"/>
+            <a:lvl6pPr marL="2514600" indent="0">
+              <a:buNone/>
+              <a:defRPr sz="1760" b="1"/>
             </a:lvl6pPr>
-            <a:lvl7pPr marL="548640" indent="0">
-              <a:buNone/>
-              <a:defRPr sz="320" b="1"/>
+            <a:lvl7pPr marL="3017520" indent="0">
+              <a:buNone/>
+              <a:defRPr sz="1760" b="1"/>
             </a:lvl7pPr>
-            <a:lvl8pPr marL="640080" indent="0">
-              <a:buNone/>
-              <a:defRPr sz="320" b="1"/>
+            <a:lvl8pPr marL="3520440" indent="0">
+              <a:buNone/>
+              <a:defRPr sz="1760" b="1"/>
             </a:lvl8pPr>
-            <a:lvl9pPr marL="731520" indent="0">
-              <a:buNone/>
-              <a:defRPr sz="320" b="1"/>
+            <a:lvl9pPr marL="4023360" indent="0">
+              <a:buNone/>
+              <a:defRPr sz="1760" b="1"/>
             </a:lvl9pPr>
           </a:lstStyle>
           <a:p>
@@ -1685,8 +2021,8 @@
         </p:nvSpPr>
         <p:spPr>
           <a:xfrm>
-            <a:off x="925830" y="668020"/>
-            <a:ext cx="777478" cy="982557"/>
+            <a:off x="5092066" y="3674110"/>
+            <a:ext cx="4276130" cy="5404062"/>
           </a:xfrm>
         </p:spPr>
         <p:txBody>
@@ -1747,7 +2083,7 @@
           <a:p>
             <a:fld id="{18EE90AF-9406-4728-9C06-C25B5621831A}" type="datetimeFigureOut">
               <a:rPr lang="en-US" smtClean="0"/>
-              <a:t>11/13/2021</a:t>
+              <a:t>11/18/2021</a:t>
             </a:fld>
             <a:endParaRPr lang="en-US"/>
           </a:p>
@@ -1798,7 +2134,7 @@
     </p:spTree>
     <p:extLst>
       <p:ext uri="{BB962C8B-B14F-4D97-AF65-F5344CB8AC3E}">
-        <p14:creationId xmlns:p14="http://schemas.microsoft.com/office/powerpoint/2010/main" val="2230446647"/>
+        <p14:creationId xmlns:p14="http://schemas.microsoft.com/office/powerpoint/2010/main" val="3705935299"/>
       </p:ext>
     </p:extLst>
   </p:cSld>
@@ -1865,7 +2201,7 @@
           <a:p>
             <a:fld id="{18EE90AF-9406-4728-9C06-C25B5621831A}" type="datetimeFigureOut">
               <a:rPr lang="en-US" smtClean="0"/>
-              <a:t>11/13/2021</a:t>
+              <a:t>11/18/2021</a:t>
             </a:fld>
             <a:endParaRPr lang="en-US"/>
           </a:p>
@@ -1916,7 +2252,7 @@
     </p:spTree>
     <p:extLst>
       <p:ext uri="{BB962C8B-B14F-4D97-AF65-F5344CB8AC3E}">
-        <p14:creationId xmlns:p14="http://schemas.microsoft.com/office/powerpoint/2010/main" val="1966720010"/>
+        <p14:creationId xmlns:p14="http://schemas.microsoft.com/office/powerpoint/2010/main" val="1902892"/>
       </p:ext>
     </p:extLst>
   </p:cSld>
@@ -1960,7 +2296,7 @@
           <a:p>
             <a:fld id="{18EE90AF-9406-4728-9C06-C25B5621831A}" type="datetimeFigureOut">
               <a:rPr lang="en-US" smtClean="0"/>
-              <a:t>11/13/2021</a:t>
+              <a:t>11/18/2021</a:t>
             </a:fld>
             <a:endParaRPr lang="en-US"/>
           </a:p>
@@ -2011,7 +2347,7 @@
     </p:spTree>
     <p:extLst>
       <p:ext uri="{BB962C8B-B14F-4D97-AF65-F5344CB8AC3E}">
-        <p14:creationId xmlns:p14="http://schemas.microsoft.com/office/powerpoint/2010/main" val="2865072509"/>
+        <p14:creationId xmlns:p14="http://schemas.microsoft.com/office/powerpoint/2010/main" val="701874101"/>
       </p:ext>
     </p:extLst>
   </p:cSld>
@@ -2050,15 +2386,15 @@
         </p:nvSpPr>
         <p:spPr>
           <a:xfrm>
-            <a:off x="125968" y="121920"/>
-            <a:ext cx="589836" cy="426720"/>
+            <a:off x="692825" y="670560"/>
+            <a:ext cx="3244096" cy="2346960"/>
           </a:xfrm>
         </p:spPr>
         <p:txBody>
           <a:bodyPr anchor="b"/>
           <a:lstStyle>
             <a:lvl1pPr>
-              <a:defRPr sz="640"/>
+              <a:defRPr sz="3520"/>
             </a:lvl1pPr>
           </a:lstStyle>
           <a:p>
@@ -2082,39 +2418,39 @@
         </p:nvSpPr>
         <p:spPr>
           <a:xfrm>
-            <a:off x="777478" y="263314"/>
-            <a:ext cx="925830" cy="1299633"/>
+            <a:off x="4276130" y="1448226"/>
+            <a:ext cx="5092065" cy="7147983"/>
           </a:xfrm>
         </p:spPr>
         <p:txBody>
           <a:bodyPr/>
           <a:lstStyle>
             <a:lvl1pPr>
-              <a:defRPr sz="640"/>
+              <a:defRPr sz="3520"/>
             </a:lvl1pPr>
             <a:lvl2pPr>
-              <a:defRPr sz="560"/>
+              <a:defRPr sz="3080"/>
             </a:lvl2pPr>
             <a:lvl3pPr>
-              <a:defRPr sz="480"/>
+              <a:defRPr sz="2640"/>
             </a:lvl3pPr>
             <a:lvl4pPr>
-              <a:defRPr sz="400"/>
+              <a:defRPr sz="2200"/>
             </a:lvl4pPr>
             <a:lvl5pPr>
-              <a:defRPr sz="400"/>
+              <a:defRPr sz="2200"/>
             </a:lvl5pPr>
             <a:lvl6pPr>
-              <a:defRPr sz="400"/>
+              <a:defRPr sz="2200"/>
             </a:lvl6pPr>
             <a:lvl7pPr>
-              <a:defRPr sz="400"/>
+              <a:defRPr sz="2200"/>
             </a:lvl7pPr>
             <a:lvl8pPr>
-              <a:defRPr sz="400"/>
+              <a:defRPr sz="2200"/>
             </a:lvl8pPr>
             <a:lvl9pPr>
-              <a:defRPr sz="400"/>
+              <a:defRPr sz="2200"/>
             </a:lvl9pPr>
           </a:lstStyle>
           <a:p>
@@ -2167,8 +2503,8 @@
         </p:nvSpPr>
         <p:spPr>
           <a:xfrm>
-            <a:off x="125968" y="548640"/>
-            <a:ext cx="589836" cy="1016423"/>
+            <a:off x="692825" y="3017520"/>
+            <a:ext cx="3244096" cy="5590329"/>
           </a:xfrm>
         </p:spPr>
         <p:txBody>
@@ -2176,39 +2512,39 @@
           <a:lstStyle>
             <a:lvl1pPr marL="0" indent="0">
               <a:buNone/>
-              <a:defRPr sz="320"/>
+              <a:defRPr sz="1760"/>
             </a:lvl1pPr>
-            <a:lvl2pPr marL="91440" indent="0">
-              <a:buNone/>
-              <a:defRPr sz="280"/>
+            <a:lvl2pPr marL="502920" indent="0">
+              <a:buNone/>
+              <a:defRPr sz="1540"/>
             </a:lvl2pPr>
-            <a:lvl3pPr marL="182880" indent="0">
-              <a:buNone/>
-              <a:defRPr sz="240"/>
+            <a:lvl3pPr marL="1005840" indent="0">
+              <a:buNone/>
+              <a:defRPr sz="1320"/>
             </a:lvl3pPr>
-            <a:lvl4pPr marL="274320" indent="0">
-              <a:buNone/>
-              <a:defRPr sz="200"/>
+            <a:lvl4pPr marL="1508760" indent="0">
+              <a:buNone/>
+              <a:defRPr sz="1100"/>
             </a:lvl4pPr>
-            <a:lvl5pPr marL="365760" indent="0">
-              <a:buNone/>
-              <a:defRPr sz="200"/>
+            <a:lvl5pPr marL="2011680" indent="0">
+              <a:buNone/>
+              <a:defRPr sz="1100"/>
             </a:lvl5pPr>
-            <a:lvl6pPr marL="457200" indent="0">
-              <a:buNone/>
-              <a:defRPr sz="200"/>
+            <a:lvl6pPr marL="2514600" indent="0">
+              <a:buNone/>
+              <a:defRPr sz="1100"/>
             </a:lvl6pPr>
-            <a:lvl7pPr marL="548640" indent="0">
-              <a:buNone/>
-              <a:defRPr sz="200"/>
+            <a:lvl7pPr marL="3017520" indent="0">
+              <a:buNone/>
+              <a:defRPr sz="1100"/>
             </a:lvl7pPr>
-            <a:lvl8pPr marL="640080" indent="0">
-              <a:buNone/>
-              <a:defRPr sz="200"/>
+            <a:lvl8pPr marL="3520440" indent="0">
+              <a:buNone/>
+              <a:defRPr sz="1100"/>
             </a:lvl8pPr>
-            <a:lvl9pPr marL="731520" indent="0">
-              <a:buNone/>
-              <a:defRPr sz="200"/>
+            <a:lvl9pPr marL="4023360" indent="0">
+              <a:buNone/>
+              <a:defRPr sz="1100"/>
             </a:lvl9pPr>
           </a:lstStyle>
           <a:p>
@@ -2237,7 +2573,7 @@
           <a:p>
             <a:fld id="{18EE90AF-9406-4728-9C06-C25B5621831A}" type="datetimeFigureOut">
               <a:rPr lang="en-US" smtClean="0"/>
-              <a:t>11/13/2021</a:t>
+              <a:t>11/18/2021</a:t>
             </a:fld>
             <a:endParaRPr lang="en-US"/>
           </a:p>
@@ -2288,7 +2624,7 @@
     </p:spTree>
     <p:extLst>
       <p:ext uri="{BB962C8B-B14F-4D97-AF65-F5344CB8AC3E}">
-        <p14:creationId xmlns:p14="http://schemas.microsoft.com/office/powerpoint/2010/main" val="3354646326"/>
+        <p14:creationId xmlns:p14="http://schemas.microsoft.com/office/powerpoint/2010/main" val="2507093768"/>
       </p:ext>
     </p:extLst>
   </p:cSld>
@@ -2327,15 +2663,15 @@
         </p:nvSpPr>
         <p:spPr>
           <a:xfrm>
-            <a:off x="125968" y="121920"/>
-            <a:ext cx="589836" cy="426720"/>
+            <a:off x="692825" y="670560"/>
+            <a:ext cx="3244096" cy="2346960"/>
           </a:xfrm>
         </p:spPr>
         <p:txBody>
           <a:bodyPr anchor="b"/>
           <a:lstStyle>
             <a:lvl1pPr>
-              <a:defRPr sz="640"/>
+              <a:defRPr sz="3520"/>
             </a:lvl1pPr>
           </a:lstStyle>
           <a:p>
@@ -2359,8 +2695,8 @@
         </p:nvSpPr>
         <p:spPr>
           <a:xfrm>
-            <a:off x="777478" y="263314"/>
-            <a:ext cx="925830" cy="1299633"/>
+            <a:off x="4276130" y="1448226"/>
+            <a:ext cx="5092065" cy="7147983"/>
           </a:xfrm>
         </p:spPr>
         <p:txBody>
@@ -2368,39 +2704,39 @@
           <a:lstStyle>
             <a:lvl1pPr marL="0" indent="0">
               <a:buNone/>
-              <a:defRPr sz="640"/>
+              <a:defRPr sz="3520"/>
             </a:lvl1pPr>
-            <a:lvl2pPr marL="91440" indent="0">
-              <a:buNone/>
-              <a:defRPr sz="560"/>
+            <a:lvl2pPr marL="502920" indent="0">
+              <a:buNone/>
+              <a:defRPr sz="3080"/>
             </a:lvl2pPr>
-            <a:lvl3pPr marL="182880" indent="0">
-              <a:buNone/>
-              <a:defRPr sz="480"/>
+            <a:lvl3pPr marL="1005840" indent="0">
+              <a:buNone/>
+              <a:defRPr sz="2640"/>
             </a:lvl3pPr>
-            <a:lvl4pPr marL="274320" indent="0">
-              <a:buNone/>
-              <a:defRPr sz="400"/>
+            <a:lvl4pPr marL="1508760" indent="0">
+              <a:buNone/>
+              <a:defRPr sz="2200"/>
             </a:lvl4pPr>
-            <a:lvl5pPr marL="365760" indent="0">
-              <a:buNone/>
-              <a:defRPr sz="400"/>
+            <a:lvl5pPr marL="2011680" indent="0">
+              <a:buNone/>
+              <a:defRPr sz="2200"/>
             </a:lvl5pPr>
-            <a:lvl6pPr marL="457200" indent="0">
-              <a:buNone/>
-              <a:defRPr sz="400"/>
+            <a:lvl6pPr marL="2514600" indent="0">
+              <a:buNone/>
+              <a:defRPr sz="2200"/>
             </a:lvl6pPr>
-            <a:lvl7pPr marL="548640" indent="0">
-              <a:buNone/>
-              <a:defRPr sz="400"/>
+            <a:lvl7pPr marL="3017520" indent="0">
+              <a:buNone/>
+              <a:defRPr sz="2200"/>
             </a:lvl7pPr>
-            <a:lvl8pPr marL="640080" indent="0">
-              <a:buNone/>
-              <a:defRPr sz="400"/>
+            <a:lvl8pPr marL="3520440" indent="0">
+              <a:buNone/>
+              <a:defRPr sz="2200"/>
             </a:lvl8pPr>
-            <a:lvl9pPr marL="731520" indent="0">
-              <a:buNone/>
-              <a:defRPr sz="400"/>
+            <a:lvl9pPr marL="4023360" indent="0">
+              <a:buNone/>
+              <a:defRPr sz="2200"/>
             </a:lvl9pPr>
           </a:lstStyle>
           <a:p>
@@ -2424,8 +2760,8 @@
         </p:nvSpPr>
         <p:spPr>
           <a:xfrm>
-            <a:off x="125968" y="548640"/>
-            <a:ext cx="589836" cy="1016423"/>
+            <a:off x="692825" y="3017520"/>
+            <a:ext cx="3244096" cy="5590329"/>
           </a:xfrm>
         </p:spPr>
         <p:txBody>
@@ -2433,39 +2769,39 @@
           <a:lstStyle>
             <a:lvl1pPr marL="0" indent="0">
               <a:buNone/>
-              <a:defRPr sz="320"/>
+              <a:defRPr sz="1760"/>
             </a:lvl1pPr>
-            <a:lvl2pPr marL="91440" indent="0">
-              <a:buNone/>
-              <a:defRPr sz="280"/>
+            <a:lvl2pPr marL="502920" indent="0">
+              <a:buNone/>
+              <a:defRPr sz="1540"/>
             </a:lvl2pPr>
-            <a:lvl3pPr marL="182880" indent="0">
-              <a:buNone/>
-              <a:defRPr sz="240"/>
+            <a:lvl3pPr marL="1005840" indent="0">
+              <a:buNone/>
+              <a:defRPr sz="1320"/>
             </a:lvl3pPr>
-            <a:lvl4pPr marL="274320" indent="0">
-              <a:buNone/>
-              <a:defRPr sz="200"/>
+            <a:lvl4pPr marL="1508760" indent="0">
+              <a:buNone/>
+              <a:defRPr sz="1100"/>
             </a:lvl4pPr>
-            <a:lvl5pPr marL="365760" indent="0">
-              <a:buNone/>
-              <a:defRPr sz="200"/>
+            <a:lvl5pPr marL="2011680" indent="0">
+              <a:buNone/>
+              <a:defRPr sz="1100"/>
             </a:lvl5pPr>
-            <a:lvl6pPr marL="457200" indent="0">
-              <a:buNone/>
-              <a:defRPr sz="200"/>
+            <a:lvl6pPr marL="2514600" indent="0">
+              <a:buNone/>
+              <a:defRPr sz="1100"/>
             </a:lvl6pPr>
-            <a:lvl7pPr marL="548640" indent="0">
-              <a:buNone/>
-              <a:defRPr sz="200"/>
+            <a:lvl7pPr marL="3017520" indent="0">
+              <a:buNone/>
+              <a:defRPr sz="1100"/>
             </a:lvl7pPr>
-            <a:lvl8pPr marL="640080" indent="0">
-              <a:buNone/>
-              <a:defRPr sz="200"/>
+            <a:lvl8pPr marL="3520440" indent="0">
+              <a:buNone/>
+              <a:defRPr sz="1100"/>
             </a:lvl8pPr>
-            <a:lvl9pPr marL="731520" indent="0">
-              <a:buNone/>
-              <a:defRPr sz="200"/>
+            <a:lvl9pPr marL="4023360" indent="0">
+              <a:buNone/>
+              <a:defRPr sz="1100"/>
             </a:lvl9pPr>
           </a:lstStyle>
           <a:p>
@@ -2494,7 +2830,7 @@
           <a:p>
             <a:fld id="{18EE90AF-9406-4728-9C06-C25B5621831A}" type="datetimeFigureOut">
               <a:rPr lang="en-US" smtClean="0"/>
-              <a:t>11/13/2021</a:t>
+              <a:t>11/18/2021</a:t>
             </a:fld>
             <a:endParaRPr lang="en-US"/>
           </a:p>
@@ -2545,7 +2881,7 @@
     </p:spTree>
     <p:extLst>
       <p:ext uri="{BB962C8B-B14F-4D97-AF65-F5344CB8AC3E}">
-        <p14:creationId xmlns:p14="http://schemas.microsoft.com/office/powerpoint/2010/main" val="3289207310"/>
+        <p14:creationId xmlns:p14="http://schemas.microsoft.com/office/powerpoint/2010/main" val="4161143716"/>
       </p:ext>
     </p:extLst>
   </p:cSld>
@@ -2589,8 +2925,8 @@
         </p:nvSpPr>
         <p:spPr>
           <a:xfrm>
-            <a:off x="125730" y="97367"/>
-            <a:ext cx="1577340" cy="353483"/>
+            <a:off x="691515" y="535519"/>
+            <a:ext cx="8675370" cy="1944159"/>
           </a:xfrm>
           <a:prstGeom prst="rect">
             <a:avLst/>
@@ -2622,8 +2958,8 @@
         </p:nvSpPr>
         <p:spPr>
           <a:xfrm>
-            <a:off x="125730" y="486833"/>
-            <a:ext cx="1577340" cy="1160357"/>
+            <a:off x="691515" y="2677584"/>
+            <a:ext cx="8675370" cy="6381962"/>
           </a:xfrm>
           <a:prstGeom prst="rect">
             <a:avLst/>
@@ -2684,8 +3020,8 @@
         </p:nvSpPr>
         <p:spPr>
           <a:xfrm>
-            <a:off x="125730" y="1695027"/>
-            <a:ext cx="411480" cy="97367"/>
+            <a:off x="691515" y="9322649"/>
+            <a:ext cx="2263140" cy="535517"/>
           </a:xfrm>
           <a:prstGeom prst="rect">
             <a:avLst/>
@@ -2695,7 +3031,7 @@
           <a:bodyPr vert="horz" lIns="91440" tIns="45720" rIns="91440" bIns="45720" rtlCol="0" anchor="ctr"/>
           <a:lstStyle>
             <a:lvl1pPr algn="l">
-              <a:defRPr sz="240">
+              <a:defRPr sz="1320">
                 <a:solidFill>
                   <a:schemeClr val="tx1">
                     <a:tint val="75000"/>
@@ -2707,7 +3043,7 @@
           <a:p>
             <a:fld id="{18EE90AF-9406-4728-9C06-C25B5621831A}" type="datetimeFigureOut">
               <a:rPr lang="en-US" smtClean="0"/>
-              <a:t>11/13/2021</a:t>
+              <a:t>11/18/2021</a:t>
             </a:fld>
             <a:endParaRPr lang="en-US"/>
           </a:p>
@@ -2725,8 +3061,8 @@
         </p:nvSpPr>
         <p:spPr>
           <a:xfrm>
-            <a:off x="605790" y="1695027"/>
-            <a:ext cx="617220" cy="97367"/>
+            <a:off x="3331845" y="9322649"/>
+            <a:ext cx="3394710" cy="535517"/>
           </a:xfrm>
           <a:prstGeom prst="rect">
             <a:avLst/>
@@ -2736,7 +3072,7 @@
           <a:bodyPr vert="horz" lIns="91440" tIns="45720" rIns="91440" bIns="45720" rtlCol="0" anchor="ctr"/>
           <a:lstStyle>
             <a:lvl1pPr algn="ctr">
-              <a:defRPr sz="240">
+              <a:defRPr sz="1320">
                 <a:solidFill>
                   <a:schemeClr val="tx1">
                     <a:tint val="75000"/>
@@ -2762,8 +3098,8 @@
         </p:nvSpPr>
         <p:spPr>
           <a:xfrm>
-            <a:off x="1291590" y="1695027"/>
-            <a:ext cx="411480" cy="97367"/>
+            <a:off x="7103745" y="9322649"/>
+            <a:ext cx="2263140" cy="535517"/>
           </a:xfrm>
           <a:prstGeom prst="rect">
             <a:avLst/>
@@ -2773,7 +3109,7 @@
           <a:bodyPr vert="horz" lIns="91440" tIns="45720" rIns="91440" bIns="45720" rtlCol="0" anchor="ctr"/>
           <a:lstStyle>
             <a:lvl1pPr algn="r">
-              <a:defRPr sz="240">
+              <a:defRPr sz="1320">
                 <a:solidFill>
                   <a:schemeClr val="tx1">
                     <a:tint val="75000"/>
@@ -2794,27 +3130,27 @@
     </p:spTree>
     <p:extLst>
       <p:ext uri="{BB962C8B-B14F-4D97-AF65-F5344CB8AC3E}">
-        <p14:creationId xmlns:p14="http://schemas.microsoft.com/office/powerpoint/2010/main" val="1221472670"/>
+        <p14:creationId xmlns:p14="http://schemas.microsoft.com/office/powerpoint/2010/main" val="1322498674"/>
       </p:ext>
     </p:extLst>
   </p:cSld>
   <p:clrMap bg1="lt1" tx1="dk1" bg2="lt2" tx2="dk2" accent1="accent1" accent2="accent2" accent3="accent3" accent4="accent4" accent5="accent5" accent6="accent6" hlink="hlink" folHlink="folHlink"/>
   <p:sldLayoutIdLst>
-    <p:sldLayoutId id="2147483661" r:id="rId1"/>
-    <p:sldLayoutId id="2147483662" r:id="rId2"/>
-    <p:sldLayoutId id="2147483663" r:id="rId3"/>
-    <p:sldLayoutId id="2147483664" r:id="rId4"/>
-    <p:sldLayoutId id="2147483665" r:id="rId5"/>
-    <p:sldLayoutId id="2147483666" r:id="rId6"/>
-    <p:sldLayoutId id="2147483667" r:id="rId7"/>
-    <p:sldLayoutId id="2147483668" r:id="rId8"/>
-    <p:sldLayoutId id="2147483669" r:id="rId9"/>
-    <p:sldLayoutId id="2147483670" r:id="rId10"/>
-    <p:sldLayoutId id="2147483671" r:id="rId11"/>
+    <p:sldLayoutId id="2147483673" r:id="rId1"/>
+    <p:sldLayoutId id="2147483674" r:id="rId2"/>
+    <p:sldLayoutId id="2147483675" r:id="rId3"/>
+    <p:sldLayoutId id="2147483676" r:id="rId4"/>
+    <p:sldLayoutId id="2147483677" r:id="rId5"/>
+    <p:sldLayoutId id="2147483678" r:id="rId6"/>
+    <p:sldLayoutId id="2147483679" r:id="rId7"/>
+    <p:sldLayoutId id="2147483680" r:id="rId8"/>
+    <p:sldLayoutId id="2147483681" r:id="rId9"/>
+    <p:sldLayoutId id="2147483682" r:id="rId10"/>
+    <p:sldLayoutId id="2147483683" r:id="rId11"/>
   </p:sldLayoutIdLst>
   <p:txStyles>
     <p:titleStyle>
-      <a:lvl1pPr algn="l" defTabSz="182880" rtl="0" eaLnBrk="1" latinLnBrk="0" hangingPunct="1">
+      <a:lvl1pPr algn="l" defTabSz="1005840" rtl="0" eaLnBrk="1" latinLnBrk="0" hangingPunct="1">
         <a:lnSpc>
           <a:spcPct val="90000"/>
         </a:lnSpc>
@@ -2822,7 +3158,7 @@
           <a:spcPct val="0"/>
         </a:spcBef>
         <a:buNone/>
-        <a:defRPr sz="880" kern="1200">
+        <a:defRPr sz="4840" kern="1200">
           <a:solidFill>
             <a:schemeClr val="tx1"/>
           </a:solidFill>
@@ -2833,16 +3169,16 @@
       </a:lvl1pPr>
     </p:titleStyle>
     <p:bodyStyle>
-      <a:lvl1pPr marL="45720" indent="-45720" algn="l" defTabSz="182880" rtl="0" eaLnBrk="1" latinLnBrk="0" hangingPunct="1">
+      <a:lvl1pPr marL="251460" indent="-251460" algn="l" defTabSz="1005840" rtl="0" eaLnBrk="1" latinLnBrk="0" hangingPunct="1">
         <a:lnSpc>
           <a:spcPct val="90000"/>
         </a:lnSpc>
         <a:spcBef>
-          <a:spcPts val="200"/>
+          <a:spcPts val="1100"/>
         </a:spcBef>
         <a:buFont typeface="Arial" panose="020B0604020202020204" pitchFamily="34" charset="0"/>
         <a:buChar char="•"/>
-        <a:defRPr sz="560" kern="1200">
+        <a:defRPr sz="3080" kern="1200">
           <a:solidFill>
             <a:schemeClr val="tx1"/>
           </a:solidFill>
@@ -2851,16 +3187,16 @@
           <a:cs typeface="+mn-cs"/>
         </a:defRPr>
       </a:lvl1pPr>
-      <a:lvl2pPr marL="137160" indent="-45720" algn="l" defTabSz="182880" rtl="0" eaLnBrk="1" latinLnBrk="0" hangingPunct="1">
+      <a:lvl2pPr marL="754380" indent="-251460" algn="l" defTabSz="1005840" rtl="0" eaLnBrk="1" latinLnBrk="0" hangingPunct="1">
         <a:lnSpc>
           <a:spcPct val="90000"/>
         </a:lnSpc>
         <a:spcBef>
-          <a:spcPts val="100"/>
+          <a:spcPts val="550"/>
         </a:spcBef>
         <a:buFont typeface="Arial" panose="020B0604020202020204" pitchFamily="34" charset="0"/>
         <a:buChar char="•"/>
-        <a:defRPr sz="480" kern="1200">
+        <a:defRPr sz="2640" kern="1200">
           <a:solidFill>
             <a:schemeClr val="tx1"/>
           </a:solidFill>
@@ -2869,16 +3205,16 @@
           <a:cs typeface="+mn-cs"/>
         </a:defRPr>
       </a:lvl2pPr>
-      <a:lvl3pPr marL="228600" indent="-45720" algn="l" defTabSz="182880" rtl="0" eaLnBrk="1" latinLnBrk="0" hangingPunct="1">
+      <a:lvl3pPr marL="1257300" indent="-251460" algn="l" defTabSz="1005840" rtl="0" eaLnBrk="1" latinLnBrk="0" hangingPunct="1">
         <a:lnSpc>
           <a:spcPct val="90000"/>
         </a:lnSpc>
         <a:spcBef>
-          <a:spcPts val="100"/>
+          <a:spcPts val="550"/>
         </a:spcBef>
         <a:buFont typeface="Arial" panose="020B0604020202020204" pitchFamily="34" charset="0"/>
         <a:buChar char="•"/>
-        <a:defRPr sz="400" kern="1200">
+        <a:defRPr sz="2200" kern="1200">
           <a:solidFill>
             <a:schemeClr val="tx1"/>
           </a:solidFill>
@@ -2887,16 +3223,16 @@
           <a:cs typeface="+mn-cs"/>
         </a:defRPr>
       </a:lvl3pPr>
-      <a:lvl4pPr marL="320040" indent="-45720" algn="l" defTabSz="182880" rtl="0" eaLnBrk="1" latinLnBrk="0" hangingPunct="1">
+      <a:lvl4pPr marL="1760220" indent="-251460" algn="l" defTabSz="1005840" rtl="0" eaLnBrk="1" latinLnBrk="0" hangingPunct="1">
         <a:lnSpc>
           <a:spcPct val="90000"/>
         </a:lnSpc>
         <a:spcBef>
-          <a:spcPts val="100"/>
+          <a:spcPts val="550"/>
         </a:spcBef>
         <a:buFont typeface="Arial" panose="020B0604020202020204" pitchFamily="34" charset="0"/>
         <a:buChar char="•"/>
-        <a:defRPr sz="360" kern="1200">
+        <a:defRPr sz="1980" kern="1200">
           <a:solidFill>
             <a:schemeClr val="tx1"/>
           </a:solidFill>
@@ -2905,16 +3241,16 @@
           <a:cs typeface="+mn-cs"/>
         </a:defRPr>
       </a:lvl4pPr>
-      <a:lvl5pPr marL="411480" indent="-45720" algn="l" defTabSz="182880" rtl="0" eaLnBrk="1" latinLnBrk="0" hangingPunct="1">
+      <a:lvl5pPr marL="2263140" indent="-251460" algn="l" defTabSz="1005840" rtl="0" eaLnBrk="1" latinLnBrk="0" hangingPunct="1">
         <a:lnSpc>
           <a:spcPct val="90000"/>
         </a:lnSpc>
         <a:spcBef>
-          <a:spcPts val="100"/>
+          <a:spcPts val="550"/>
         </a:spcBef>
         <a:buFont typeface="Arial" panose="020B0604020202020204" pitchFamily="34" charset="0"/>
         <a:buChar char="•"/>
-        <a:defRPr sz="360" kern="1200">
+        <a:defRPr sz="1980" kern="1200">
           <a:solidFill>
             <a:schemeClr val="tx1"/>
           </a:solidFill>
@@ -2923,16 +3259,16 @@
           <a:cs typeface="+mn-cs"/>
         </a:defRPr>
       </a:lvl5pPr>
-      <a:lvl6pPr marL="502920" indent="-45720" algn="l" defTabSz="182880" rtl="0" eaLnBrk="1" latinLnBrk="0" hangingPunct="1">
+      <a:lvl6pPr marL="2766060" indent="-251460" algn="l" defTabSz="1005840" rtl="0" eaLnBrk="1" latinLnBrk="0" hangingPunct="1">
         <a:lnSpc>
           <a:spcPct val="90000"/>
         </a:lnSpc>
         <a:spcBef>
-          <a:spcPts val="100"/>
+          <a:spcPts val="550"/>
         </a:spcBef>
         <a:buFont typeface="Arial" panose="020B0604020202020204" pitchFamily="34" charset="0"/>
         <a:buChar char="•"/>
-        <a:defRPr sz="360" kern="1200">
+        <a:defRPr sz="1980" kern="1200">
           <a:solidFill>
             <a:schemeClr val="tx1"/>
           </a:solidFill>
@@ -2941,16 +3277,16 @@
           <a:cs typeface="+mn-cs"/>
         </a:defRPr>
       </a:lvl6pPr>
-      <a:lvl7pPr marL="594360" indent="-45720" algn="l" defTabSz="182880" rtl="0" eaLnBrk="1" latinLnBrk="0" hangingPunct="1">
+      <a:lvl7pPr marL="3268980" indent="-251460" algn="l" defTabSz="1005840" rtl="0" eaLnBrk="1" latinLnBrk="0" hangingPunct="1">
         <a:lnSpc>
           <a:spcPct val="90000"/>
         </a:lnSpc>
         <a:spcBef>
-          <a:spcPts val="100"/>
+          <a:spcPts val="550"/>
         </a:spcBef>
         <a:buFont typeface="Arial" panose="020B0604020202020204" pitchFamily="34" charset="0"/>
         <a:buChar char="•"/>
-        <a:defRPr sz="360" kern="1200">
+        <a:defRPr sz="1980" kern="1200">
           <a:solidFill>
             <a:schemeClr val="tx1"/>
           </a:solidFill>
@@ -2959,16 +3295,16 @@
           <a:cs typeface="+mn-cs"/>
         </a:defRPr>
       </a:lvl7pPr>
-      <a:lvl8pPr marL="685800" indent="-45720" algn="l" defTabSz="182880" rtl="0" eaLnBrk="1" latinLnBrk="0" hangingPunct="1">
+      <a:lvl8pPr marL="3771900" indent="-251460" algn="l" defTabSz="1005840" rtl="0" eaLnBrk="1" latinLnBrk="0" hangingPunct="1">
         <a:lnSpc>
           <a:spcPct val="90000"/>
         </a:lnSpc>
         <a:spcBef>
-          <a:spcPts val="100"/>
+          <a:spcPts val="550"/>
         </a:spcBef>
         <a:buFont typeface="Arial" panose="020B0604020202020204" pitchFamily="34" charset="0"/>
         <a:buChar char="•"/>
-        <a:defRPr sz="360" kern="1200">
+        <a:defRPr sz="1980" kern="1200">
           <a:solidFill>
             <a:schemeClr val="tx1"/>
           </a:solidFill>
@@ -2977,16 +3313,16 @@
           <a:cs typeface="+mn-cs"/>
         </a:defRPr>
       </a:lvl8pPr>
-      <a:lvl9pPr marL="777240" indent="-45720" algn="l" defTabSz="182880" rtl="0" eaLnBrk="1" latinLnBrk="0" hangingPunct="1">
+      <a:lvl9pPr marL="4274820" indent="-251460" algn="l" defTabSz="1005840" rtl="0" eaLnBrk="1" latinLnBrk="0" hangingPunct="1">
         <a:lnSpc>
           <a:spcPct val="90000"/>
         </a:lnSpc>
         <a:spcBef>
-          <a:spcPts val="100"/>
+          <a:spcPts val="550"/>
         </a:spcBef>
         <a:buFont typeface="Arial" panose="020B0604020202020204" pitchFamily="34" charset="0"/>
         <a:buChar char="•"/>
-        <a:defRPr sz="360" kern="1200">
+        <a:defRPr sz="1980" kern="1200">
           <a:solidFill>
             <a:schemeClr val="tx1"/>
           </a:solidFill>
@@ -3000,8 +3336,8 @@
       <a:defPPr>
         <a:defRPr lang="en-US"/>
       </a:defPPr>
-      <a:lvl1pPr marL="0" algn="l" defTabSz="182880" rtl="0" eaLnBrk="1" latinLnBrk="0" hangingPunct="1">
-        <a:defRPr sz="360" kern="1200">
+      <a:lvl1pPr marL="0" algn="l" defTabSz="1005840" rtl="0" eaLnBrk="1" latinLnBrk="0" hangingPunct="1">
+        <a:defRPr sz="1980" kern="1200">
           <a:solidFill>
             <a:schemeClr val="tx1"/>
           </a:solidFill>
@@ -3010,8 +3346,8 @@
           <a:cs typeface="+mn-cs"/>
         </a:defRPr>
       </a:lvl1pPr>
-      <a:lvl2pPr marL="91440" algn="l" defTabSz="182880" rtl="0" eaLnBrk="1" latinLnBrk="0" hangingPunct="1">
-        <a:defRPr sz="360" kern="1200">
+      <a:lvl2pPr marL="502920" algn="l" defTabSz="1005840" rtl="0" eaLnBrk="1" latinLnBrk="0" hangingPunct="1">
+        <a:defRPr sz="1980" kern="1200">
           <a:solidFill>
             <a:schemeClr val="tx1"/>
           </a:solidFill>
@@ -3020,8 +3356,8 @@
           <a:cs typeface="+mn-cs"/>
         </a:defRPr>
       </a:lvl2pPr>
-      <a:lvl3pPr marL="182880" algn="l" defTabSz="182880" rtl="0" eaLnBrk="1" latinLnBrk="0" hangingPunct="1">
-        <a:defRPr sz="360" kern="1200">
+      <a:lvl3pPr marL="1005840" algn="l" defTabSz="1005840" rtl="0" eaLnBrk="1" latinLnBrk="0" hangingPunct="1">
+        <a:defRPr sz="1980" kern="1200">
           <a:solidFill>
             <a:schemeClr val="tx1"/>
           </a:solidFill>
@@ -3030,8 +3366,8 @@
           <a:cs typeface="+mn-cs"/>
         </a:defRPr>
       </a:lvl3pPr>
-      <a:lvl4pPr marL="274320" algn="l" defTabSz="182880" rtl="0" eaLnBrk="1" latinLnBrk="0" hangingPunct="1">
-        <a:defRPr sz="360" kern="1200">
+      <a:lvl4pPr marL="1508760" algn="l" defTabSz="1005840" rtl="0" eaLnBrk="1" latinLnBrk="0" hangingPunct="1">
+        <a:defRPr sz="1980" kern="1200">
           <a:solidFill>
             <a:schemeClr val="tx1"/>
           </a:solidFill>
@@ -3040,8 +3376,8 @@
           <a:cs typeface="+mn-cs"/>
         </a:defRPr>
       </a:lvl4pPr>
-      <a:lvl5pPr marL="365760" algn="l" defTabSz="182880" rtl="0" eaLnBrk="1" latinLnBrk="0" hangingPunct="1">
-        <a:defRPr sz="360" kern="1200">
+      <a:lvl5pPr marL="2011680" algn="l" defTabSz="1005840" rtl="0" eaLnBrk="1" latinLnBrk="0" hangingPunct="1">
+        <a:defRPr sz="1980" kern="1200">
           <a:solidFill>
             <a:schemeClr val="tx1"/>
           </a:solidFill>
@@ -3050,8 +3386,8 @@
           <a:cs typeface="+mn-cs"/>
         </a:defRPr>
       </a:lvl5pPr>
-      <a:lvl6pPr marL="457200" algn="l" defTabSz="182880" rtl="0" eaLnBrk="1" latinLnBrk="0" hangingPunct="1">
-        <a:defRPr sz="360" kern="1200">
+      <a:lvl6pPr marL="2514600" algn="l" defTabSz="1005840" rtl="0" eaLnBrk="1" latinLnBrk="0" hangingPunct="1">
+        <a:defRPr sz="1980" kern="1200">
           <a:solidFill>
             <a:schemeClr val="tx1"/>
           </a:solidFill>
@@ -3060,8 +3396,8 @@
           <a:cs typeface="+mn-cs"/>
         </a:defRPr>
       </a:lvl6pPr>
-      <a:lvl7pPr marL="548640" algn="l" defTabSz="182880" rtl="0" eaLnBrk="1" latinLnBrk="0" hangingPunct="1">
-        <a:defRPr sz="360" kern="1200">
+      <a:lvl7pPr marL="3017520" algn="l" defTabSz="1005840" rtl="0" eaLnBrk="1" latinLnBrk="0" hangingPunct="1">
+        <a:defRPr sz="1980" kern="1200">
           <a:solidFill>
             <a:schemeClr val="tx1"/>
           </a:solidFill>
@@ -3070,8 +3406,8 @@
           <a:cs typeface="+mn-cs"/>
         </a:defRPr>
       </a:lvl7pPr>
-      <a:lvl8pPr marL="640080" algn="l" defTabSz="182880" rtl="0" eaLnBrk="1" latinLnBrk="0" hangingPunct="1">
-        <a:defRPr sz="360" kern="1200">
+      <a:lvl8pPr marL="3520440" algn="l" defTabSz="1005840" rtl="0" eaLnBrk="1" latinLnBrk="0" hangingPunct="1">
+        <a:defRPr sz="1980" kern="1200">
           <a:solidFill>
             <a:schemeClr val="tx1"/>
           </a:solidFill>
@@ -3080,8 +3416,8 @@
           <a:cs typeface="+mn-cs"/>
         </a:defRPr>
       </a:lvl8pPr>
-      <a:lvl9pPr marL="731520" algn="l" defTabSz="182880" rtl="0" eaLnBrk="1" latinLnBrk="0" hangingPunct="1">
-        <a:defRPr sz="360" kern="1200">
+      <a:lvl9pPr marL="4023360" algn="l" defTabSz="1005840" rtl="0" eaLnBrk="1" latinLnBrk="0" hangingPunct="1">
+        <a:defRPr sz="1980" kern="1200">
           <a:solidFill>
             <a:schemeClr val="tx1"/>
           </a:solidFill>
@@ -3134,8 +3470,8 @@
         </p:nvSpPr>
         <p:spPr>
           <a:xfrm>
-            <a:off x="492760" y="147900"/>
-            <a:ext cx="843280" cy="1533000"/>
+            <a:off x="2710180" y="813450"/>
+            <a:ext cx="4638040" cy="8431500"/>
           </a:xfrm>
           <a:custGeom>
             <a:avLst/>
@@ -3221,7 +3557,7 @@
           <a:lstStyle/>
           <a:p>
             <a:pPr algn="ctr"/>
-            <a:endParaRPr lang="en-US"/>
+            <a:endParaRPr lang="en-US" sz="43318"/>
           </a:p>
         </p:txBody>
       </p:sp>
@@ -3277,8 +3613,8 @@
         </p:nvSpPr>
         <p:spPr>
           <a:xfrm>
-            <a:off x="412124" y="1311"/>
-            <a:ext cx="1004553" cy="1826179"/>
+            <a:off x="2266690" y="7219"/>
+            <a:ext cx="5525042" cy="10043985"/>
           </a:xfrm>
           <a:custGeom>
             <a:avLst/>
@@ -3361,36 +3697,14 @@
           <a:bodyPr rtlCol="0" anchor="ctr"/>
           <a:lstStyle/>
           <a:p>
-            <a:pPr marL="0" marR="0" lvl="0" indent="0" algn="ctr" defTabSz="457200" rtl="0" eaLnBrk="1" fontAlgn="auto" latinLnBrk="0" hangingPunct="1">
-              <a:lnSpc>
-                <a:spcPct val="100000"/>
-              </a:lnSpc>
-              <a:spcBef>
-                <a:spcPts val="0"/>
-              </a:spcBef>
-              <a:spcAft>
-                <a:spcPts val="0"/>
-              </a:spcAft>
-              <a:buClrTx/>
-              <a:buSzTx/>
-              <a:buFontTx/>
-              <a:buNone/>
-              <a:tabLst/>
+            <a:pPr algn="ctr" defTabSz="2514914">
               <a:defRPr/>
             </a:pPr>
-            <a:endParaRPr kumimoji="0" lang="en-US" sz="1800" b="0" i="0" u="none" strike="noStrike" kern="1200" cap="none" spc="0" normalizeH="0" baseline="0" noProof="0">
-              <a:ln>
-                <a:noFill/>
-              </a:ln>
+            <a:endParaRPr lang="en-US" sz="9900">
               <a:solidFill>
                 <a:prstClr val="white"/>
               </a:solidFill>
-              <a:effectLst/>
-              <a:uLnTx/>
-              <a:uFillTx/>
               <a:latin typeface="Calibri" panose="020F0502020204030204"/>
-              <a:ea typeface="+mn-ea"/>
-              <a:cs typeface="+mn-cs"/>
             </a:endParaRPr>
           </a:p>
         </p:txBody>
@@ -3447,8 +3761,156 @@
         </p:nvSpPr>
         <p:spPr>
           <a:xfrm>
-            <a:off x="492760" y="147900"/>
-            <a:ext cx="843280" cy="1533000"/>
+            <a:off x="45040" y="2351995"/>
+            <a:ext cx="9968320" cy="5354410"/>
+          </a:xfrm>
+          <a:custGeom>
+            <a:avLst/>
+            <a:gdLst>
+              <a:gd name="connsiteX0" fmla="*/ 205740 w 411480"/>
+              <a:gd name="connsiteY0" fmla="*/ 0 h 748030"/>
+              <a:gd name="connsiteX1" fmla="*/ 411480 w 411480"/>
+              <a:gd name="connsiteY1" fmla="*/ 748030 h 748030"/>
+              <a:gd name="connsiteX2" fmla="*/ 205740 w 411480"/>
+              <a:gd name="connsiteY2" fmla="*/ 510540 h 748030"/>
+              <a:gd name="connsiteX3" fmla="*/ 0 w 411480"/>
+              <a:gd name="connsiteY3" fmla="*/ 746760 h 748030"/>
+              <a:gd name="connsiteX4" fmla="*/ 205740 w 411480"/>
+              <a:gd name="connsiteY4" fmla="*/ 0 h 748030"/>
+            </a:gdLst>
+            <a:ahLst/>
+            <a:cxnLst>
+              <a:cxn ang="0">
+                <a:pos x="connsiteX0" y="connsiteY0"/>
+              </a:cxn>
+              <a:cxn ang="0">
+                <a:pos x="connsiteX1" y="connsiteY1"/>
+              </a:cxn>
+              <a:cxn ang="0">
+                <a:pos x="connsiteX2" y="connsiteY2"/>
+              </a:cxn>
+              <a:cxn ang="0">
+                <a:pos x="connsiteX3" y="connsiteY3"/>
+              </a:cxn>
+              <a:cxn ang="0">
+                <a:pos x="connsiteX4" y="connsiteY4"/>
+              </a:cxn>
+            </a:cxnLst>
+            <a:rect l="l" t="t" r="r" b="b"/>
+            <a:pathLst>
+              <a:path w="411480" h="748030">
+                <a:moveTo>
+                  <a:pt x="205740" y="0"/>
+                </a:moveTo>
+                <a:lnTo>
+                  <a:pt x="411480" y="748030"/>
+                </a:lnTo>
+                <a:lnTo>
+                  <a:pt x="205740" y="510540"/>
+                </a:lnTo>
+                <a:lnTo>
+                  <a:pt x="0" y="746760"/>
+                </a:lnTo>
+                <a:lnTo>
+                  <a:pt x="205740" y="0"/>
+                </a:lnTo>
+                <a:close/>
+              </a:path>
+            </a:pathLst>
+          </a:custGeom>
+          <a:solidFill>
+            <a:srgbClr val="FF0000"/>
+          </a:solidFill>
+          <a:ln>
+            <a:noFill/>
+          </a:ln>
+        </p:spPr>
+        <p:style>
+          <a:lnRef idx="2">
+            <a:schemeClr val="accent1">
+              <a:shade val="50000"/>
+            </a:schemeClr>
+          </a:lnRef>
+          <a:fillRef idx="1">
+            <a:schemeClr val="accent1"/>
+          </a:fillRef>
+          <a:effectRef idx="0">
+            <a:schemeClr val="accent1"/>
+          </a:effectRef>
+          <a:fontRef idx="minor">
+            <a:schemeClr val="lt1"/>
+          </a:fontRef>
+        </p:style>
+        <p:txBody>
+          <a:bodyPr rtlCol="0" anchor="ctr"/>
+          <a:lstStyle/>
+          <a:p>
+            <a:pPr algn="ctr" defTabSz="2514914">
+              <a:defRPr/>
+            </a:pPr>
+            <a:endParaRPr lang="en-US" sz="9900">
+              <a:solidFill>
+                <a:prstClr val="white"/>
+              </a:solidFill>
+              <a:latin typeface="Calibri" panose="020F0502020204030204"/>
+            </a:endParaRPr>
+          </a:p>
+        </p:txBody>
+      </p:sp>
+    </p:spTree>
+    <p:extLst>
+      <p:ext uri="{BB962C8B-B14F-4D97-AF65-F5344CB8AC3E}">
+        <p14:creationId xmlns:p14="http://schemas.microsoft.com/office/powerpoint/2010/main" val="2020050380"/>
+      </p:ext>
+    </p:extLst>
+  </p:cSld>
+  <p:clrMapOvr>
+    <a:masterClrMapping/>
+  </p:clrMapOvr>
+</p:sld>
+</file>
+
+<file path=ppt/slides/slide4.xml><?xml version="1.0" encoding="utf-8"?>
+<p:sld xmlns:a="http://schemas.openxmlformats.org/drawingml/2006/main" xmlns:r="http://schemas.openxmlformats.org/officeDocument/2006/relationships" xmlns:p="http://schemas.openxmlformats.org/presentationml/2006/main">
+  <p:cSld>
+    <p:bg>
+      <p:bgPr>
+        <a:solidFill>
+          <a:schemeClr val="tx1"/>
+        </a:solidFill>
+        <a:effectLst/>
+      </p:bgPr>
+    </p:bg>
+    <p:spTree>
+      <p:nvGrpSpPr>
+        <p:cNvPr id="1" name=""/>
+        <p:cNvGrpSpPr/>
+        <p:nvPr/>
+      </p:nvGrpSpPr>
+      <p:grpSpPr>
+        <a:xfrm>
+          <a:off x="0" y="0"/>
+          <a:ext cx="0" cy="0"/>
+          <a:chOff x="0" y="0"/>
+          <a:chExt cx="0" cy="0"/>
+        </a:xfrm>
+      </p:grpSpPr>
+      <p:sp>
+        <p:nvSpPr>
+          <p:cNvPr id="13" name="Freeform: Shape 12">
+            <a:extLst>
+              <a:ext uri="{FF2B5EF4-FFF2-40B4-BE49-F238E27FC236}">
+                <a16:creationId xmlns:a16="http://schemas.microsoft.com/office/drawing/2014/main" id="{CFDD104E-47D7-4EDD-ACE7-AF9FDCFD3301}"/>
+              </a:ext>
+            </a:extLst>
+          </p:cNvPr>
+          <p:cNvSpPr/>
+          <p:nvPr/>
+        </p:nvSpPr>
+        <p:spPr>
+          <a:xfrm>
+            <a:off x="2710180" y="813450"/>
+            <a:ext cx="4638040" cy="8431500"/>
           </a:xfrm>
           <a:custGeom>
             <a:avLst/>
@@ -3534,7 +3996,7 @@
           <a:lstStyle/>
           <a:p>
             <a:pPr algn="ctr"/>
-            <a:endParaRPr lang="en-US"/>
+            <a:endParaRPr lang="en-US" sz="43318"/>
           </a:p>
         </p:txBody>
       </p:sp>
@@ -3542,6 +4004,154 @@
     <p:extLst>
       <p:ext uri="{BB962C8B-B14F-4D97-AF65-F5344CB8AC3E}">
         <p14:creationId xmlns:p14="http://schemas.microsoft.com/office/powerpoint/2010/main" val="3770827803"/>
+      </p:ext>
+    </p:extLst>
+  </p:cSld>
+  <p:clrMapOvr>
+    <a:masterClrMapping/>
+  </p:clrMapOvr>
+</p:sld>
+</file>
+
+<file path=ppt/slides/slide5.xml><?xml version="1.0" encoding="utf-8"?>
+<p:sld xmlns:a="http://schemas.openxmlformats.org/drawingml/2006/main" xmlns:r="http://schemas.openxmlformats.org/officeDocument/2006/relationships" xmlns:p="http://schemas.openxmlformats.org/presentationml/2006/main">
+  <p:cSld>
+    <p:bg>
+      <p:bgPr>
+        <a:solidFill>
+          <a:schemeClr val="tx1"/>
+        </a:solidFill>
+        <a:effectLst/>
+      </p:bgPr>
+    </p:bg>
+    <p:spTree>
+      <p:nvGrpSpPr>
+        <p:cNvPr id="1" name=""/>
+        <p:cNvGrpSpPr/>
+        <p:nvPr/>
+      </p:nvGrpSpPr>
+      <p:grpSpPr>
+        <a:xfrm>
+          <a:off x="0" y="0"/>
+          <a:ext cx="0" cy="0"/>
+          <a:chOff x="0" y="0"/>
+          <a:chExt cx="0" cy="0"/>
+        </a:xfrm>
+      </p:grpSpPr>
+      <p:sp>
+        <p:nvSpPr>
+          <p:cNvPr id="13" name="Freeform: Shape 12">
+            <a:extLst>
+              <a:ext uri="{FF2B5EF4-FFF2-40B4-BE49-F238E27FC236}">
+                <a16:creationId xmlns:a16="http://schemas.microsoft.com/office/drawing/2014/main" id="{CFDD104E-47D7-4EDD-ACE7-AF9FDCFD3301}"/>
+              </a:ext>
+            </a:extLst>
+          </p:cNvPr>
+          <p:cNvSpPr/>
+          <p:nvPr/>
+        </p:nvSpPr>
+        <p:spPr>
+          <a:xfrm>
+            <a:off x="45040" y="2351995"/>
+            <a:ext cx="9968320" cy="5354410"/>
+          </a:xfrm>
+          <a:custGeom>
+            <a:avLst/>
+            <a:gdLst>
+              <a:gd name="connsiteX0" fmla="*/ 205740 w 411480"/>
+              <a:gd name="connsiteY0" fmla="*/ 0 h 748030"/>
+              <a:gd name="connsiteX1" fmla="*/ 411480 w 411480"/>
+              <a:gd name="connsiteY1" fmla="*/ 748030 h 748030"/>
+              <a:gd name="connsiteX2" fmla="*/ 205740 w 411480"/>
+              <a:gd name="connsiteY2" fmla="*/ 510540 h 748030"/>
+              <a:gd name="connsiteX3" fmla="*/ 0 w 411480"/>
+              <a:gd name="connsiteY3" fmla="*/ 746760 h 748030"/>
+              <a:gd name="connsiteX4" fmla="*/ 205740 w 411480"/>
+              <a:gd name="connsiteY4" fmla="*/ 0 h 748030"/>
+            </a:gdLst>
+            <a:ahLst/>
+            <a:cxnLst>
+              <a:cxn ang="0">
+                <a:pos x="connsiteX0" y="connsiteY0"/>
+              </a:cxn>
+              <a:cxn ang="0">
+                <a:pos x="connsiteX1" y="connsiteY1"/>
+              </a:cxn>
+              <a:cxn ang="0">
+                <a:pos x="connsiteX2" y="connsiteY2"/>
+              </a:cxn>
+              <a:cxn ang="0">
+                <a:pos x="connsiteX3" y="connsiteY3"/>
+              </a:cxn>
+              <a:cxn ang="0">
+                <a:pos x="connsiteX4" y="connsiteY4"/>
+              </a:cxn>
+            </a:cxnLst>
+            <a:rect l="l" t="t" r="r" b="b"/>
+            <a:pathLst>
+              <a:path w="411480" h="748030">
+                <a:moveTo>
+                  <a:pt x="205740" y="0"/>
+                </a:moveTo>
+                <a:lnTo>
+                  <a:pt x="411480" y="748030"/>
+                </a:lnTo>
+                <a:lnTo>
+                  <a:pt x="205740" y="510540"/>
+                </a:lnTo>
+                <a:lnTo>
+                  <a:pt x="0" y="746760"/>
+                </a:lnTo>
+                <a:lnTo>
+                  <a:pt x="205740" y="0"/>
+                </a:lnTo>
+                <a:close/>
+              </a:path>
+            </a:pathLst>
+          </a:custGeom>
+          <a:solidFill>
+            <a:srgbClr val="7030A0"/>
+          </a:solidFill>
+          <a:ln>
+            <a:noFill/>
+          </a:ln>
+        </p:spPr>
+        <p:style>
+          <a:lnRef idx="2">
+            <a:schemeClr val="accent1">
+              <a:shade val="50000"/>
+            </a:schemeClr>
+          </a:lnRef>
+          <a:fillRef idx="1">
+            <a:schemeClr val="accent1"/>
+          </a:fillRef>
+          <a:effectRef idx="0">
+            <a:schemeClr val="accent1"/>
+          </a:effectRef>
+          <a:fontRef idx="minor">
+            <a:schemeClr val="lt1"/>
+          </a:fontRef>
+        </p:style>
+        <p:txBody>
+          <a:bodyPr rtlCol="0" anchor="ctr"/>
+          <a:lstStyle/>
+          <a:p>
+            <a:pPr algn="ctr" defTabSz="2514914">
+              <a:defRPr/>
+            </a:pPr>
+            <a:endParaRPr lang="en-US" sz="9900">
+              <a:solidFill>
+                <a:prstClr val="white"/>
+              </a:solidFill>
+              <a:latin typeface="Calibri" panose="020F0502020204030204"/>
+            </a:endParaRPr>
+          </a:p>
+        </p:txBody>
+      </p:sp>
+    </p:spTree>
+    <p:extLst>
+      <p:ext uri="{BB962C8B-B14F-4D97-AF65-F5344CB8AC3E}">
+        <p14:creationId xmlns:p14="http://schemas.microsoft.com/office/powerpoint/2010/main" val="1703431415"/>
       </p:ext>
     </p:extLst>
   </p:cSld>

</xml_diff>